<commit_message>
Added PDF version of poster
</commit_message>
<xml_diff>
--- a/poster/poster.pptx
+++ b/poster/poster.pptx
@@ -4,11 +4,14 @@
   <p:sldMasterIdLst>
     <p:sldMasterId id="2147483660" r:id="rId1"/>
   </p:sldMasterIdLst>
+  <p:notesMasterIdLst>
+    <p:notesMasterId r:id="rId3"/>
+  </p:notesMasterIdLst>
   <p:sldIdLst>
     <p:sldId id="256" r:id="rId2"/>
   </p:sldIdLst>
   <p:sldSz cx="21383625" cy="30275213"/>
-  <p:notesSz cx="6858000" cy="9144000"/>
+  <p:notesSz cx="7315200" cy="9601200"/>
   <p:defaultTextStyle>
     <a:defPPr>
       <a:defRPr lang="en-US"/>
@@ -112,6 +115,356 @@
 </p:presentation>
 </file>
 
+<file path=ppt/notesMasters/notesMaster1.xml><?xml version="1.0" encoding="utf-8"?>
+<p:notesMaster xmlns:a="http://schemas.openxmlformats.org/drawingml/2006/main" xmlns:r="http://schemas.openxmlformats.org/officeDocument/2006/relationships" xmlns:p="http://schemas.openxmlformats.org/presentationml/2006/main">
+  <p:cSld>
+    <p:bg>
+      <p:bgRef idx="1001">
+        <a:schemeClr val="bg1"/>
+      </p:bgRef>
+    </p:bg>
+    <p:spTree>
+      <p:nvGrpSpPr>
+        <p:cNvPr id="1" name=""/>
+        <p:cNvGrpSpPr/>
+        <p:nvPr/>
+      </p:nvGrpSpPr>
+      <p:grpSpPr>
+        <a:xfrm>
+          <a:off x="0" y="0"/>
+          <a:ext cx="0" cy="0"/>
+          <a:chOff x="0" y="0"/>
+          <a:chExt cx="0" cy="0"/>
+        </a:xfrm>
+      </p:grpSpPr>
+      <p:sp>
+        <p:nvSpPr>
+          <p:cNvPr id="2" name="Header Placeholder 1"/>
+          <p:cNvSpPr>
+            <a:spLocks noGrp="1"/>
+          </p:cNvSpPr>
+          <p:nvPr>
+            <p:ph type="hdr" sz="quarter"/>
+          </p:nvPr>
+        </p:nvSpPr>
+        <p:spPr>
+          <a:xfrm>
+            <a:off x="0" y="0"/>
+            <a:ext cx="3170238" cy="481013"/>
+          </a:xfrm>
+          <a:prstGeom prst="rect">
+            <a:avLst/>
+          </a:prstGeom>
+        </p:spPr>
+        <p:txBody>
+          <a:bodyPr vert="horz" lIns="91440" tIns="45720" rIns="91440" bIns="45720" rtlCol="0"/>
+          <a:lstStyle>
+            <a:lvl1pPr algn="l">
+              <a:defRPr sz="1200"/>
+            </a:lvl1pPr>
+          </a:lstStyle>
+          <a:p>
+            <a:endParaRPr lang="en-GB"/>
+          </a:p>
+        </p:txBody>
+      </p:sp>
+      <p:sp>
+        <p:nvSpPr>
+          <p:cNvPr id="3" name="Date Placeholder 2"/>
+          <p:cNvSpPr>
+            <a:spLocks noGrp="1"/>
+          </p:cNvSpPr>
+          <p:nvPr>
+            <p:ph type="dt" idx="1"/>
+          </p:nvPr>
+        </p:nvSpPr>
+        <p:spPr>
+          <a:xfrm>
+            <a:off x="4143375" y="0"/>
+            <a:ext cx="3170238" cy="481013"/>
+          </a:xfrm>
+          <a:prstGeom prst="rect">
+            <a:avLst/>
+          </a:prstGeom>
+        </p:spPr>
+        <p:txBody>
+          <a:bodyPr vert="horz" lIns="91440" tIns="45720" rIns="91440" bIns="45720" rtlCol="0"/>
+          <a:lstStyle>
+            <a:lvl1pPr algn="r">
+              <a:defRPr sz="1200"/>
+            </a:lvl1pPr>
+          </a:lstStyle>
+          <a:p>
+            <a:fld id="{3BC1AFD8-657F-48F7-A693-8E7AF2433BCD}" type="datetimeFigureOut">
+              <a:rPr lang="en-GB" smtClean="0"/>
+              <a:t>10/08/2018</a:t>
+            </a:fld>
+            <a:endParaRPr lang="en-GB"/>
+          </a:p>
+        </p:txBody>
+      </p:sp>
+      <p:sp>
+        <p:nvSpPr>
+          <p:cNvPr id="4" name="Slide Image Placeholder 3"/>
+          <p:cNvSpPr>
+            <a:spLocks noGrp="1" noRot="1" noChangeAspect="1"/>
+          </p:cNvSpPr>
+          <p:nvPr>
+            <p:ph type="sldImg" idx="2"/>
+          </p:nvPr>
+        </p:nvSpPr>
+        <p:spPr>
+          <a:xfrm>
+            <a:off x="2513013" y="1200150"/>
+            <a:ext cx="2289175" cy="3240088"/>
+          </a:xfrm>
+          <a:prstGeom prst="rect">
+            <a:avLst/>
+          </a:prstGeom>
+          <a:noFill/>
+          <a:ln w="12700">
+            <a:solidFill>
+              <a:prstClr val="black"/>
+            </a:solidFill>
+          </a:ln>
+        </p:spPr>
+        <p:txBody>
+          <a:bodyPr vert="horz" lIns="91440" tIns="45720" rIns="91440" bIns="45720" rtlCol="0" anchor="ctr"/>
+          <a:lstStyle/>
+          <a:p>
+            <a:endParaRPr lang="en-GB"/>
+          </a:p>
+        </p:txBody>
+      </p:sp>
+      <p:sp>
+        <p:nvSpPr>
+          <p:cNvPr id="5" name="Notes Placeholder 4"/>
+          <p:cNvSpPr>
+            <a:spLocks noGrp="1"/>
+          </p:cNvSpPr>
+          <p:nvPr>
+            <p:ph type="body" sz="quarter" idx="3"/>
+          </p:nvPr>
+        </p:nvSpPr>
+        <p:spPr>
+          <a:xfrm>
+            <a:off x="731838" y="4621213"/>
+            <a:ext cx="5851525" cy="3779837"/>
+          </a:xfrm>
+          <a:prstGeom prst="rect">
+            <a:avLst/>
+          </a:prstGeom>
+        </p:spPr>
+        <p:txBody>
+          <a:bodyPr vert="horz" lIns="91440" tIns="45720" rIns="91440" bIns="45720" rtlCol="0"/>
+          <a:lstStyle/>
+          <a:p>
+            <a:pPr lvl="0"/>
+            <a:r>
+              <a:rPr lang="en-US"/>
+              <a:t>Edit Master text styles</a:t>
+            </a:r>
+          </a:p>
+          <a:p>
+            <a:pPr lvl="1"/>
+            <a:r>
+              <a:rPr lang="en-US"/>
+              <a:t>Second level</a:t>
+            </a:r>
+          </a:p>
+          <a:p>
+            <a:pPr lvl="2"/>
+            <a:r>
+              <a:rPr lang="en-US"/>
+              <a:t>Third level</a:t>
+            </a:r>
+          </a:p>
+          <a:p>
+            <a:pPr lvl="3"/>
+            <a:r>
+              <a:rPr lang="en-US"/>
+              <a:t>Fourth level</a:t>
+            </a:r>
+          </a:p>
+          <a:p>
+            <a:pPr lvl="4"/>
+            <a:r>
+              <a:rPr lang="en-US"/>
+              <a:t>Fifth level</a:t>
+            </a:r>
+            <a:endParaRPr lang="en-GB"/>
+          </a:p>
+        </p:txBody>
+      </p:sp>
+      <p:sp>
+        <p:nvSpPr>
+          <p:cNvPr id="6" name="Footer Placeholder 5"/>
+          <p:cNvSpPr>
+            <a:spLocks noGrp="1"/>
+          </p:cNvSpPr>
+          <p:nvPr>
+            <p:ph type="ftr" sz="quarter" idx="4"/>
+          </p:nvPr>
+        </p:nvSpPr>
+        <p:spPr>
+          <a:xfrm>
+            <a:off x="0" y="9120188"/>
+            <a:ext cx="3170238" cy="481012"/>
+          </a:xfrm>
+          <a:prstGeom prst="rect">
+            <a:avLst/>
+          </a:prstGeom>
+        </p:spPr>
+        <p:txBody>
+          <a:bodyPr vert="horz" lIns="91440" tIns="45720" rIns="91440" bIns="45720" rtlCol="0" anchor="b"/>
+          <a:lstStyle>
+            <a:lvl1pPr algn="l">
+              <a:defRPr sz="1200"/>
+            </a:lvl1pPr>
+          </a:lstStyle>
+          <a:p>
+            <a:endParaRPr lang="en-GB"/>
+          </a:p>
+        </p:txBody>
+      </p:sp>
+      <p:sp>
+        <p:nvSpPr>
+          <p:cNvPr id="7" name="Slide Number Placeholder 6"/>
+          <p:cNvSpPr>
+            <a:spLocks noGrp="1"/>
+          </p:cNvSpPr>
+          <p:nvPr>
+            <p:ph type="sldNum" sz="quarter" idx="5"/>
+          </p:nvPr>
+        </p:nvSpPr>
+        <p:spPr>
+          <a:xfrm>
+            <a:off x="4143375" y="9120188"/>
+            <a:ext cx="3170238" cy="481012"/>
+          </a:xfrm>
+          <a:prstGeom prst="rect">
+            <a:avLst/>
+          </a:prstGeom>
+        </p:spPr>
+        <p:txBody>
+          <a:bodyPr vert="horz" lIns="91440" tIns="45720" rIns="91440" bIns="45720" rtlCol="0" anchor="b"/>
+          <a:lstStyle>
+            <a:lvl1pPr algn="r">
+              <a:defRPr sz="1200"/>
+            </a:lvl1pPr>
+          </a:lstStyle>
+          <a:p>
+            <a:fld id="{F140E082-B430-4C41-885C-C6C175DA9F2F}" type="slidenum">
+              <a:rPr lang="en-GB" smtClean="0"/>
+              <a:t>‹#›</a:t>
+            </a:fld>
+            <a:endParaRPr lang="en-GB"/>
+          </a:p>
+        </p:txBody>
+      </p:sp>
+    </p:spTree>
+    <p:extLst>
+      <p:ext uri="{BB962C8B-B14F-4D97-AF65-F5344CB8AC3E}">
+        <p14:creationId xmlns:p14="http://schemas.microsoft.com/office/powerpoint/2010/main" val="136759685"/>
+      </p:ext>
+    </p:extLst>
+  </p:cSld>
+  <p:clrMap bg1="lt1" tx1="dk1" bg2="lt2" tx2="dk2" accent1="accent1" accent2="accent2" accent3="accent3" accent4="accent4" accent5="accent5" accent6="accent6" hlink="hlink" folHlink="folHlink"/>
+  <p:notesStyle>
+    <a:lvl1pPr marL="0" algn="l" defTabSz="914400" rtl="0" eaLnBrk="1" latinLnBrk="0" hangingPunct="1">
+      <a:defRPr sz="1200" kern="1200">
+        <a:solidFill>
+          <a:schemeClr val="tx1"/>
+        </a:solidFill>
+        <a:latin typeface="+mn-lt"/>
+        <a:ea typeface="+mn-ea"/>
+        <a:cs typeface="+mn-cs"/>
+      </a:defRPr>
+    </a:lvl1pPr>
+    <a:lvl2pPr marL="457200" algn="l" defTabSz="914400" rtl="0" eaLnBrk="1" latinLnBrk="0" hangingPunct="1">
+      <a:defRPr sz="1200" kern="1200">
+        <a:solidFill>
+          <a:schemeClr val="tx1"/>
+        </a:solidFill>
+        <a:latin typeface="+mn-lt"/>
+        <a:ea typeface="+mn-ea"/>
+        <a:cs typeface="+mn-cs"/>
+      </a:defRPr>
+    </a:lvl2pPr>
+    <a:lvl3pPr marL="914400" algn="l" defTabSz="914400" rtl="0" eaLnBrk="1" latinLnBrk="0" hangingPunct="1">
+      <a:defRPr sz="1200" kern="1200">
+        <a:solidFill>
+          <a:schemeClr val="tx1"/>
+        </a:solidFill>
+        <a:latin typeface="+mn-lt"/>
+        <a:ea typeface="+mn-ea"/>
+        <a:cs typeface="+mn-cs"/>
+      </a:defRPr>
+    </a:lvl3pPr>
+    <a:lvl4pPr marL="1371600" algn="l" defTabSz="914400" rtl="0" eaLnBrk="1" latinLnBrk="0" hangingPunct="1">
+      <a:defRPr sz="1200" kern="1200">
+        <a:solidFill>
+          <a:schemeClr val="tx1"/>
+        </a:solidFill>
+        <a:latin typeface="+mn-lt"/>
+        <a:ea typeface="+mn-ea"/>
+        <a:cs typeface="+mn-cs"/>
+      </a:defRPr>
+    </a:lvl4pPr>
+    <a:lvl5pPr marL="1828800" algn="l" defTabSz="914400" rtl="0" eaLnBrk="1" latinLnBrk="0" hangingPunct="1">
+      <a:defRPr sz="1200" kern="1200">
+        <a:solidFill>
+          <a:schemeClr val="tx1"/>
+        </a:solidFill>
+        <a:latin typeface="+mn-lt"/>
+        <a:ea typeface="+mn-ea"/>
+        <a:cs typeface="+mn-cs"/>
+      </a:defRPr>
+    </a:lvl5pPr>
+    <a:lvl6pPr marL="2286000" algn="l" defTabSz="914400" rtl="0" eaLnBrk="1" latinLnBrk="0" hangingPunct="1">
+      <a:defRPr sz="1200" kern="1200">
+        <a:solidFill>
+          <a:schemeClr val="tx1"/>
+        </a:solidFill>
+        <a:latin typeface="+mn-lt"/>
+        <a:ea typeface="+mn-ea"/>
+        <a:cs typeface="+mn-cs"/>
+      </a:defRPr>
+    </a:lvl6pPr>
+    <a:lvl7pPr marL="2743200" algn="l" defTabSz="914400" rtl="0" eaLnBrk="1" latinLnBrk="0" hangingPunct="1">
+      <a:defRPr sz="1200" kern="1200">
+        <a:solidFill>
+          <a:schemeClr val="tx1"/>
+        </a:solidFill>
+        <a:latin typeface="+mn-lt"/>
+        <a:ea typeface="+mn-ea"/>
+        <a:cs typeface="+mn-cs"/>
+      </a:defRPr>
+    </a:lvl7pPr>
+    <a:lvl8pPr marL="3200400" algn="l" defTabSz="914400" rtl="0" eaLnBrk="1" latinLnBrk="0" hangingPunct="1">
+      <a:defRPr sz="1200" kern="1200">
+        <a:solidFill>
+          <a:schemeClr val="tx1"/>
+        </a:solidFill>
+        <a:latin typeface="+mn-lt"/>
+        <a:ea typeface="+mn-ea"/>
+        <a:cs typeface="+mn-cs"/>
+      </a:defRPr>
+    </a:lvl8pPr>
+    <a:lvl9pPr marL="3657600" algn="l" defTabSz="914400" rtl="0" eaLnBrk="1" latinLnBrk="0" hangingPunct="1">
+      <a:defRPr sz="1200" kern="1200">
+        <a:solidFill>
+          <a:schemeClr val="tx1"/>
+        </a:solidFill>
+        <a:latin typeface="+mn-lt"/>
+        <a:ea typeface="+mn-ea"/>
+        <a:cs typeface="+mn-cs"/>
+      </a:defRPr>
+    </a:lvl9pPr>
+  </p:notesStyle>
+</p:notesMaster>
+</file>
+
 <file path=ppt/slideLayouts/slideLayout1.xml><?xml version="1.0" encoding="utf-8"?>
 <p:sldLayout xmlns:a="http://schemas.openxmlformats.org/drawingml/2006/main" xmlns:r="http://schemas.openxmlformats.org/officeDocument/2006/relationships" xmlns:p="http://schemas.openxmlformats.org/presentationml/2006/main" type="title" preserve="1">
   <p:cSld name="Title Slide">
@@ -243,7 +596,7 @@
           <a:p>
             <a:fld id="{61CC7E6D-2778-4985-A783-70A96C97D3A0}" type="datetimeFigureOut">
               <a:rPr lang="en-GB" smtClean="0"/>
-              <a:t>09/08/2018</a:t>
+              <a:t>10/08/2018</a:t>
             </a:fld>
             <a:endParaRPr lang="en-GB"/>
           </a:p>
@@ -413,7 +766,7 @@
           <a:p>
             <a:fld id="{61CC7E6D-2778-4985-A783-70A96C97D3A0}" type="datetimeFigureOut">
               <a:rPr lang="en-GB" smtClean="0"/>
-              <a:t>09/08/2018</a:t>
+              <a:t>10/08/2018</a:t>
             </a:fld>
             <a:endParaRPr lang="en-GB"/>
           </a:p>
@@ -593,7 +946,7 @@
           <a:p>
             <a:fld id="{61CC7E6D-2778-4985-A783-70A96C97D3A0}" type="datetimeFigureOut">
               <a:rPr lang="en-GB" smtClean="0"/>
-              <a:t>09/08/2018</a:t>
+              <a:t>10/08/2018</a:t>
             </a:fld>
             <a:endParaRPr lang="en-GB"/>
           </a:p>
@@ -763,7 +1116,7 @@
           <a:p>
             <a:fld id="{61CC7E6D-2778-4985-A783-70A96C97D3A0}" type="datetimeFigureOut">
               <a:rPr lang="en-GB" smtClean="0"/>
-              <a:t>09/08/2018</a:t>
+              <a:t>10/08/2018</a:t>
             </a:fld>
             <a:endParaRPr lang="en-GB"/>
           </a:p>
@@ -1007,7 +1360,7 @@
           <a:p>
             <a:fld id="{61CC7E6D-2778-4985-A783-70A96C97D3A0}" type="datetimeFigureOut">
               <a:rPr lang="en-GB" smtClean="0"/>
-              <a:t>09/08/2018</a:t>
+              <a:t>10/08/2018</a:t>
             </a:fld>
             <a:endParaRPr lang="en-GB"/>
           </a:p>
@@ -1239,7 +1592,7 @@
           <a:p>
             <a:fld id="{61CC7E6D-2778-4985-A783-70A96C97D3A0}" type="datetimeFigureOut">
               <a:rPr lang="en-GB" smtClean="0"/>
-              <a:t>09/08/2018</a:t>
+              <a:t>10/08/2018</a:t>
             </a:fld>
             <a:endParaRPr lang="en-GB"/>
           </a:p>
@@ -1606,7 +1959,7 @@
           <a:p>
             <a:fld id="{61CC7E6D-2778-4985-A783-70A96C97D3A0}" type="datetimeFigureOut">
               <a:rPr lang="en-GB" smtClean="0"/>
-              <a:t>09/08/2018</a:t>
+              <a:t>10/08/2018</a:t>
             </a:fld>
             <a:endParaRPr lang="en-GB"/>
           </a:p>
@@ -1724,7 +2077,7 @@
           <a:p>
             <a:fld id="{61CC7E6D-2778-4985-A783-70A96C97D3A0}" type="datetimeFigureOut">
               <a:rPr lang="en-GB" smtClean="0"/>
-              <a:t>09/08/2018</a:t>
+              <a:t>10/08/2018</a:t>
             </a:fld>
             <a:endParaRPr lang="en-GB"/>
           </a:p>
@@ -1819,7 +2172,7 @@
           <a:p>
             <a:fld id="{61CC7E6D-2778-4985-A783-70A96C97D3A0}" type="datetimeFigureOut">
               <a:rPr lang="en-GB" smtClean="0"/>
-              <a:t>09/08/2018</a:t>
+              <a:t>10/08/2018</a:t>
             </a:fld>
             <a:endParaRPr lang="en-GB"/>
           </a:p>
@@ -2096,7 +2449,7 @@
           <a:p>
             <a:fld id="{61CC7E6D-2778-4985-A783-70A96C97D3A0}" type="datetimeFigureOut">
               <a:rPr lang="en-GB" smtClean="0"/>
-              <a:t>09/08/2018</a:t>
+              <a:t>10/08/2018</a:t>
             </a:fld>
             <a:endParaRPr lang="en-GB"/>
           </a:p>
@@ -2353,7 +2706,7 @@
           <a:p>
             <a:fld id="{61CC7E6D-2778-4985-A783-70A96C97D3A0}" type="datetimeFigureOut">
               <a:rPr lang="en-GB" smtClean="0"/>
-              <a:t>09/08/2018</a:t>
+              <a:t>10/08/2018</a:t>
             </a:fld>
             <a:endParaRPr lang="en-GB"/>
           </a:p>
@@ -2566,7 +2919,7 @@
           <a:p>
             <a:fld id="{61CC7E6D-2778-4985-A783-70A96C97D3A0}" type="datetimeFigureOut">
               <a:rPr lang="en-GB" smtClean="0"/>
-              <a:t>09/08/2018</a:t>
+              <a:t>10/08/2018</a:t>
             </a:fld>
             <a:endParaRPr lang="en-GB"/>
           </a:p>
@@ -3040,7 +3393,7 @@
         </p:nvSpPr>
         <p:spPr>
           <a:xfrm>
-            <a:off x="7442597" y="-65101"/>
+            <a:off x="-139303" y="-104038"/>
             <a:ext cx="13487400" cy="2895729"/>
           </a:xfrm>
           <a:prstGeom prst="rect">
@@ -3068,51 +3421,6 @@
                 <a:cs typeface="Mongolian Baiti" panose="03000500000000000000" pitchFamily="66" charset="0"/>
               </a:rPr>
               <a:t>Decoupling Energy Consumption and Execution Time in High Performance Computing</a:t>
-            </a:r>
-          </a:p>
-        </p:txBody>
-      </p:sp>
-      <p:sp>
-        <p:nvSpPr>
-          <p:cNvPr id="2" name="TextBox 1">
-            <a:extLst>
-              <a:ext uri="{FF2B5EF4-FFF2-40B4-BE49-F238E27FC236}">
-                <a16:creationId xmlns:a16="http://schemas.microsoft.com/office/drawing/2014/main" id="{14353EC0-7E56-4F56-B484-95CC57E1189A}"/>
-              </a:ext>
-            </a:extLst>
-          </p:cNvPr>
-          <p:cNvSpPr txBox="1"/>
-          <p:nvPr/>
-        </p:nvSpPr>
-        <p:spPr>
-          <a:xfrm>
-            <a:off x="76200" y="2082100"/>
-            <a:ext cx="7048500" cy="637803"/>
-          </a:xfrm>
-          <a:prstGeom prst="rect">
-            <a:avLst/>
-          </a:prstGeom>
-          <a:noFill/>
-        </p:spPr>
-        <p:txBody>
-          <a:bodyPr wrap="square" rtlCol="0">
-            <a:spAutoFit/>
-          </a:bodyPr>
-          <a:lstStyle/>
-          <a:p>
-            <a:pPr>
-              <a:lnSpc>
-                <a:spcPct val="125000"/>
-              </a:lnSpc>
-            </a:pPr>
-            <a:r>
-              <a:rPr lang="en-GB" sz="3100" dirty="0">
-                <a:solidFill>
-                  <a:schemeClr val="bg1"/>
-                </a:solidFill>
-                <a:latin typeface="Montserrat" panose="00000500000000000000" pitchFamily="2" charset="0"/>
-              </a:rPr>
-              <a:t>Department of Computer Science</a:t>
             </a:r>
           </a:p>
         </p:txBody>
@@ -3131,8 +3439,8 @@
         </p:nvSpPr>
         <p:spPr>
           <a:xfrm>
-            <a:off x="0" y="29567326"/>
-            <a:ext cx="10691812" cy="707886"/>
+            <a:off x="-22341" y="29644270"/>
+            <a:ext cx="10691812" cy="630942"/>
           </a:xfrm>
           <a:prstGeom prst="rect">
             <a:avLst/>
@@ -3148,7 +3456,7 @@
           <a:lstStyle/>
           <a:p>
             <a:r>
-              <a:rPr lang="en-GB" sz="4000" b="1" dirty="0">
+              <a:rPr lang="en-GB" sz="3500" b="1" dirty="0">
                 <a:solidFill>
                   <a:schemeClr val="bg1"/>
                 </a:solidFill>
@@ -3173,8 +3481,8 @@
         </p:nvSpPr>
         <p:spPr>
           <a:xfrm>
-            <a:off x="10691812" y="29567327"/>
-            <a:ext cx="10691813" cy="707886"/>
+            <a:off x="10477500" y="29644270"/>
+            <a:ext cx="10906125" cy="630942"/>
           </a:xfrm>
           <a:prstGeom prst="rect">
             <a:avLst/>
@@ -3191,7 +3499,7 @@
           <a:p>
             <a:pPr algn="r"/>
             <a:r>
-              <a:rPr lang="en-GB" sz="4000" b="1" dirty="0">
+              <a:rPr lang="en-GB" sz="3500" b="1" dirty="0">
                 <a:solidFill>
                   <a:schemeClr val="bg1"/>
                 </a:solidFill>
@@ -3200,7 +3508,7 @@
               <a:t>Supervisor: </a:t>
             </a:r>
             <a:r>
-              <a:rPr lang="en-GB" sz="4000" b="1" dirty="0" err="1">
+              <a:rPr lang="en-GB" sz="3500" b="1" dirty="0" err="1">
                 <a:solidFill>
                   <a:schemeClr val="bg1"/>
                 </a:solidFill>
@@ -3209,7 +3517,7 @@
               <a:t>Dr.</a:t>
             </a:r>
             <a:r>
-              <a:rPr lang="en-GB" sz="4000" b="1" dirty="0">
+              <a:rPr lang="en-GB" sz="3500" b="1" dirty="0">
                 <a:solidFill>
                   <a:schemeClr val="bg1"/>
                 </a:solidFill>
@@ -3234,10 +3542,10 @@
         </p:nvGrpSpPr>
         <p:grpSpPr>
           <a:xfrm>
-            <a:off x="453628" y="3478820"/>
-            <a:ext cx="5489972" cy="9410045"/>
+            <a:off x="1105678" y="3426733"/>
+            <a:ext cx="5489972" cy="11258372"/>
             <a:chOff x="453628" y="3478820"/>
-            <a:chExt cx="5489972" cy="9410045"/>
+            <a:chExt cx="5489972" cy="11258372"/>
           </a:xfrm>
         </p:grpSpPr>
         <p:sp>
@@ -3302,7 +3610,7 @@
           <p:spPr>
             <a:xfrm>
               <a:off x="453628" y="4064270"/>
-              <a:ext cx="5489972" cy="8824595"/>
+              <a:ext cx="5489972" cy="10672922"/>
             </a:xfrm>
             <a:prstGeom prst="rect">
               <a:avLst/>
@@ -3323,19 +3631,19 @@
                 <a:buChar char="•"/>
               </a:pPr>
               <a:r>
-                <a:rPr lang="en-GB" sz="2400" dirty="0">
+                <a:rPr lang="en-GB" sz="2300" dirty="0">
                   <a:latin typeface="Montserrat" panose="00000500000000000000" pitchFamily="2" charset="0"/>
                 </a:rPr>
                 <a:t>Supercomputers use an enormous amount of </a:t>
               </a:r>
               <a:r>
-                <a:rPr lang="en-GB" sz="2400" b="1" dirty="0">
+                <a:rPr lang="en-GB" sz="2300" b="1" dirty="0">
                   <a:latin typeface="Montserrat" panose="00000500000000000000" pitchFamily="2" charset="0"/>
                 </a:rPr>
                 <a:t>energy</a:t>
               </a:r>
               <a:r>
-                <a:rPr lang="en-GB" sz="2400" dirty="0">
+                <a:rPr lang="en-GB" sz="2300" dirty="0">
                   <a:latin typeface="Montserrat" panose="00000500000000000000" pitchFamily="2" charset="0"/>
                 </a:rPr>
                 <a:t> which</a:t>
@@ -3350,7 +3658,7 @@
                 <a:buChar char="•"/>
               </a:pPr>
               <a:r>
-                <a:rPr lang="en-GB" sz="2400" dirty="0">
+                <a:rPr lang="en-GB" sz="2300" dirty="0">
                   <a:latin typeface="Montserrat" panose="00000500000000000000" pitchFamily="2" charset="0"/>
                 </a:rPr>
                 <a:t>is expensive</a:t>
@@ -3365,7 +3673,7 @@
                 <a:buChar char="•"/>
               </a:pPr>
               <a:r>
-                <a:rPr lang="en-GB" sz="2400" dirty="0">
+                <a:rPr lang="en-GB" sz="2300" dirty="0">
                   <a:latin typeface="Montserrat" panose="00000500000000000000" pitchFamily="2" charset="0"/>
                 </a:rPr>
                 <a:t>has an environmental impact</a:t>
@@ -3380,17 +3688,17 @@
                 <a:buChar char="•"/>
               </a:pPr>
               <a:r>
-                <a:rPr lang="en-GB" sz="2400" dirty="0">
+                <a:rPr lang="en-GB" sz="2300" dirty="0">
                   <a:latin typeface="Montserrat" panose="00000500000000000000" pitchFamily="2" charset="0"/>
                 </a:rPr>
                 <a:t>is a limiting factor in scaling of HPC systems. </a:t>
               </a:r>
               <a:br>
-                <a:rPr lang="en-GB" sz="2400" dirty="0">
+                <a:rPr lang="en-GB" sz="2300" dirty="0">
                   <a:latin typeface="Montserrat" panose="00000500000000000000" pitchFamily="2" charset="0"/>
                 </a:rPr>
               </a:br>
-              <a:endParaRPr lang="en-GB" sz="2400" dirty="0">
+              <a:endParaRPr lang="en-GB" sz="2300" dirty="0">
                 <a:latin typeface="Montserrat" panose="00000500000000000000" pitchFamily="2" charset="0"/>
               </a:endParaRPr>
             </a:p>
@@ -3403,35 +3711,35 @@
                 <a:buChar char="•"/>
               </a:pPr>
               <a:r>
-                <a:rPr lang="en-GB" sz="2400" dirty="0">
+                <a:rPr lang="en-GB" sz="2300" dirty="0">
                   <a:latin typeface="Montserrat" panose="00000500000000000000" pitchFamily="2" charset="0"/>
                 </a:rPr>
                 <a:t>The aim of this project is to </a:t>
               </a:r>
               <a:r>
-                <a:rPr lang="en-GB" sz="2400" b="1" dirty="0">
+                <a:rPr lang="en-GB" sz="2300" b="1" dirty="0">
                   <a:latin typeface="Montserrat" panose="00000500000000000000" pitchFamily="2" charset="0"/>
                 </a:rPr>
                 <a:t>reduce energy consumption </a:t>
               </a:r>
               <a:r>
-                <a:rPr lang="en-GB" sz="2400" dirty="0">
+                <a:rPr lang="en-GB" sz="2300" dirty="0">
                   <a:latin typeface="Montserrat" panose="00000500000000000000" pitchFamily="2" charset="0"/>
                 </a:rPr>
                 <a:t>in multi-threaded, HPC programs using </a:t>
               </a:r>
               <a:r>
-                <a:rPr lang="en-GB" sz="2400" b="1" dirty="0">
+                <a:rPr lang="en-GB" sz="2300" b="1" dirty="0">
                   <a:latin typeface="Montserrat" panose="00000500000000000000" pitchFamily="2" charset="0"/>
                 </a:rPr>
-                <a:t>compiler optimisations</a:t>
+                <a:t>compiler optimisations.</a:t>
               </a:r>
               <a:br>
-                <a:rPr lang="en-GB" sz="2400" dirty="0">
+                <a:rPr lang="en-GB" sz="2300" dirty="0">
                   <a:latin typeface="Montserrat" panose="00000500000000000000" pitchFamily="2" charset="0"/>
                 </a:rPr>
               </a:br>
-              <a:endParaRPr lang="en-GB" sz="2400" dirty="0">
+              <a:endParaRPr lang="en-GB" sz="2300" dirty="0">
                 <a:latin typeface="Montserrat" panose="00000500000000000000" pitchFamily="2" charset="0"/>
               </a:endParaRPr>
             </a:p>
@@ -3444,142 +3752,74 @@
                 <a:buChar char="•"/>
               </a:pPr>
               <a:r>
-                <a:rPr lang="en-GB" sz="2400" dirty="0">
+                <a:rPr lang="en-GB" sz="2300" dirty="0">
                   <a:latin typeface="Montserrat" panose="00000500000000000000" pitchFamily="2" charset="0"/>
                 </a:rPr>
                 <a:t>The project focuses on the </a:t>
               </a:r>
               <a:r>
-                <a:rPr lang="en-GB" sz="2400" b="1" dirty="0">
+                <a:rPr lang="en-GB" sz="2300" b="1" dirty="0">
                   <a:latin typeface="Montserrat" panose="00000500000000000000" pitchFamily="2" charset="0"/>
                 </a:rPr>
                 <a:t>GCC compiler</a:t>
               </a:r>
               <a:r>
-                <a:rPr lang="en-GB" sz="2400" dirty="0">
+                <a:rPr lang="en-GB" sz="2300" dirty="0">
                   <a:latin typeface="Montserrat" panose="00000500000000000000" pitchFamily="2" charset="0"/>
                 </a:rPr>
                 <a:t> and follows the method of the </a:t>
               </a:r>
               <a:r>
-                <a:rPr lang="en-GB" sz="2400" b="1" dirty="0">
+                <a:rPr lang="en-GB" sz="2300" b="1" dirty="0">
                   <a:latin typeface="Montserrat" panose="00000500000000000000" pitchFamily="2" charset="0"/>
                 </a:rPr>
                 <a:t>Milepost</a:t>
               </a:r>
               <a:r>
-                <a:rPr lang="en-GB" sz="2400" dirty="0">
+                <a:rPr lang="en-GB" sz="2300" dirty="0">
                   <a:latin typeface="Montserrat" panose="00000500000000000000" pitchFamily="2" charset="0"/>
                 </a:rPr>
                 <a:t> study [1] but focussing on energy consumption not just execution time. </a:t>
               </a:r>
-              <a:endParaRPr lang="en-GB" sz="2200" dirty="0">
+              <a:br>
+                <a:rPr lang="en-GB" sz="2300" dirty="0">
+                  <a:latin typeface="Montserrat" panose="00000500000000000000" pitchFamily="2" charset="0"/>
+                </a:rPr>
+              </a:br>
+              <a:endParaRPr lang="en-GB" sz="2300" dirty="0">
                 <a:latin typeface="Montserrat" panose="00000500000000000000" pitchFamily="2" charset="0"/>
               </a:endParaRPr>
+            </a:p>
+            <a:p>
+              <a:pPr marL="342900" indent="-342900">
+                <a:lnSpc>
+                  <a:spcPct val="125000"/>
+                </a:lnSpc>
+                <a:buFont typeface="Arial" panose="020B0604020202020204" pitchFamily="34" charset="0"/>
+                <a:buChar char="•"/>
+              </a:pPr>
+              <a:r>
+                <a:rPr lang="en-GB" sz="2300" b="1" dirty="0">
+                  <a:latin typeface="Montserrat" panose="00000500000000000000" pitchFamily="2" charset="0"/>
+                </a:rPr>
+                <a:t>Hypothesis</a:t>
+              </a:r>
+              <a:r>
+                <a:rPr lang="en-GB" sz="2300" dirty="0">
+                  <a:latin typeface="Montserrat" panose="00000500000000000000" pitchFamily="2" charset="0"/>
+                </a:rPr>
+                <a:t>: optimising for energy consumption will yield greater reductions than optimising for execution time.</a:t>
+              </a:r>
             </a:p>
           </p:txBody>
         </p:sp>
       </p:grpSp>
-      <p:sp>
-        <p:nvSpPr>
-          <p:cNvPr id="11" name="TextBox 10">
+      <p:grpSp>
+        <p:nvGrpSpPr>
+          <p:cNvPr id="46" name="Group 45">
             <a:extLst>
               <a:ext uri="{FF2B5EF4-FFF2-40B4-BE49-F238E27FC236}">
-                <a16:creationId xmlns:a16="http://schemas.microsoft.com/office/drawing/2014/main" id="{95190EE3-34CF-4313-A41A-0BBA811BB74E}"/>
-              </a:ext>
-            </a:extLst>
-          </p:cNvPr>
-          <p:cNvSpPr txBox="1"/>
-          <p:nvPr/>
-        </p:nvSpPr>
-        <p:spPr>
-          <a:xfrm>
-            <a:off x="453627" y="25066177"/>
-            <a:ext cx="19080956" cy="625684"/>
-          </a:xfrm>
-          <a:prstGeom prst="rect">
-            <a:avLst/>
-          </a:prstGeom>
-          <a:solidFill>
-            <a:srgbClr val="235078"/>
-          </a:solidFill>
-        </p:spPr>
-        <p:txBody>
-          <a:bodyPr wrap="square" rtlCol="0">
-            <a:spAutoFit/>
-          </a:bodyPr>
-          <a:lstStyle/>
-          <a:p>
-            <a:pPr>
-              <a:lnSpc>
-                <a:spcPct val="125000"/>
-              </a:lnSpc>
-            </a:pPr>
-            <a:r>
-              <a:rPr lang="en-GB" sz="3000" b="1" dirty="0">
-                <a:solidFill>
-                  <a:schemeClr val="bg1"/>
-                </a:solidFill>
-                <a:latin typeface="Libre Baskerville" panose="02000000000000000000" pitchFamily="2" charset="0"/>
-              </a:rPr>
-              <a:t>References</a:t>
-            </a:r>
-          </a:p>
-        </p:txBody>
-      </p:sp>
-      <p:sp>
-        <p:nvSpPr>
-          <p:cNvPr id="12" name="TextBox 11">
-            <a:extLst>
-              <a:ext uri="{FF2B5EF4-FFF2-40B4-BE49-F238E27FC236}">
-                <a16:creationId xmlns:a16="http://schemas.microsoft.com/office/drawing/2014/main" id="{3A72A3CD-1E99-4628-A65D-B85FD5256F02}"/>
-              </a:ext>
-            </a:extLst>
-          </p:cNvPr>
-          <p:cNvSpPr txBox="1"/>
-          <p:nvPr/>
-        </p:nvSpPr>
-        <p:spPr>
-          <a:xfrm>
-            <a:off x="11110912" y="14490071"/>
-            <a:ext cx="8423672" cy="625684"/>
-          </a:xfrm>
-          <a:prstGeom prst="rect">
-            <a:avLst/>
-          </a:prstGeom>
-          <a:solidFill>
-            <a:srgbClr val="235078"/>
-          </a:solidFill>
-        </p:spPr>
-        <p:txBody>
-          <a:bodyPr wrap="square" rtlCol="0">
-            <a:spAutoFit/>
-          </a:bodyPr>
-          <a:lstStyle/>
-          <a:p>
-            <a:pPr>
-              <a:lnSpc>
-                <a:spcPct val="125000"/>
-              </a:lnSpc>
-            </a:pPr>
-            <a:r>
-              <a:rPr lang="en-GB" sz="3000" b="1" dirty="0">
-                <a:solidFill>
-                  <a:schemeClr val="bg1"/>
-                </a:solidFill>
-                <a:latin typeface="Libre Baskerville" panose="02000000000000000000" pitchFamily="2" charset="0"/>
-              </a:rPr>
-              <a:t>Machine Learning</a:t>
-            </a:r>
-          </a:p>
-        </p:txBody>
-      </p:sp>
-      <p:grpSp>
-        <p:nvGrpSpPr>
-          <p:cNvPr id="27" name="Group 26">
-            <a:extLst>
-              <a:ext uri="{FF2B5EF4-FFF2-40B4-BE49-F238E27FC236}">
-                <a16:creationId xmlns:a16="http://schemas.microsoft.com/office/drawing/2014/main" id="{BAB3B815-7A81-4C4D-87A2-22B02A06AF05}"/>
+                <a16:creationId xmlns:a16="http://schemas.microsoft.com/office/drawing/2014/main" id="{D82E4B2A-490F-4400-8233-23D54C693612}"/>
               </a:ext>
             </a:extLst>
           </p:cNvPr>
@@ -3588,18 +3828,18 @@
         </p:nvGrpSpPr>
         <p:grpSpPr>
           <a:xfrm>
-            <a:off x="7442597" y="3478820"/>
-            <a:ext cx="5489973" cy="4436512"/>
-            <a:chOff x="453627" y="13415270"/>
-            <a:chExt cx="5489973" cy="4436512"/>
+            <a:off x="948927" y="26764935"/>
+            <a:ext cx="19441090" cy="2821896"/>
+            <a:chOff x="453627" y="25066177"/>
+            <a:chExt cx="19080956" cy="2994226"/>
           </a:xfrm>
         </p:grpSpPr>
         <p:sp>
           <p:nvSpPr>
-            <p:cNvPr id="9" name="TextBox 8">
+            <p:cNvPr id="11" name="TextBox 10">
               <a:extLst>
                 <a:ext uri="{FF2B5EF4-FFF2-40B4-BE49-F238E27FC236}">
-                  <a16:creationId xmlns:a16="http://schemas.microsoft.com/office/drawing/2014/main" id="{66EBB19E-6B9A-49B3-B33C-625DE229A740}"/>
+                  <a16:creationId xmlns:a16="http://schemas.microsoft.com/office/drawing/2014/main" id="{95190EE3-34CF-4313-A41A-0BBA811BB74E}"/>
                 </a:ext>
               </a:extLst>
             </p:cNvPr>
@@ -3608,8 +3848,8 @@
           </p:nvSpPr>
           <p:spPr>
             <a:xfrm>
-              <a:off x="453628" y="13415270"/>
-              <a:ext cx="5489972" cy="625684"/>
+              <a:off x="453627" y="25066177"/>
+              <a:ext cx="19080956" cy="625684"/>
             </a:xfrm>
             <a:prstGeom prst="rect">
               <a:avLst/>
@@ -3636,17 +3876,17 @@
                   </a:solidFill>
                   <a:latin typeface="Libre Baskerville" panose="02000000000000000000" pitchFamily="2" charset="0"/>
                 </a:rPr>
-                <a:t>Measuring Energy</a:t>
+                <a:t>References</a:t>
               </a:r>
             </a:p>
           </p:txBody>
         </p:sp>
         <p:sp>
           <p:nvSpPr>
-            <p:cNvPr id="15" name="TextBox 14">
+            <p:cNvPr id="18" name="TextBox 17">
               <a:extLst>
                 <a:ext uri="{FF2B5EF4-FFF2-40B4-BE49-F238E27FC236}">
-                  <a16:creationId xmlns:a16="http://schemas.microsoft.com/office/drawing/2014/main" id="{36583889-AC97-4BEC-AC3F-F44E37930580}"/>
+                  <a16:creationId xmlns:a16="http://schemas.microsoft.com/office/drawing/2014/main" id="{6E355220-0461-42E2-81F4-C0A5825888F3}"/>
                 </a:ext>
               </a:extLst>
             </p:cNvPr>
@@ -3655,8 +3895,8 @@
           </p:nvSpPr>
           <p:spPr>
             <a:xfrm>
-              <a:off x="453627" y="14105500"/>
-              <a:ext cx="5489972" cy="3746282"/>
+              <a:off x="453627" y="25655333"/>
+              <a:ext cx="19080955" cy="2405070"/>
             </a:xfrm>
             <a:prstGeom prst="rect">
               <a:avLst/>
@@ -3669,60 +3909,222 @@
             </a:bodyPr>
             <a:lstStyle/>
             <a:p>
-              <a:pPr marL="342900" indent="-342900">
+              <a:pPr>
+                <a:lnSpc>
+                  <a:spcPct val="150000"/>
+                </a:lnSpc>
+              </a:pPr>
+              <a:r>
+                <a:rPr lang="en-GB" sz="1600" dirty="0">
+                  <a:latin typeface="Montserrat" panose="00000500000000000000" pitchFamily="2" charset="0"/>
+                </a:rPr>
+                <a:t>[1]  G. </a:t>
+              </a:r>
+              <a:r>
+                <a:rPr lang="en-GB" sz="1600" dirty="0" err="1">
+                  <a:latin typeface="Montserrat" panose="00000500000000000000" pitchFamily="2" charset="0"/>
+                </a:rPr>
+                <a:t>Fursin</a:t>
+              </a:r>
+              <a:r>
+                <a:rPr lang="en-GB" sz="1600" dirty="0">
+                  <a:latin typeface="Montserrat" panose="00000500000000000000" pitchFamily="2" charset="0"/>
+                </a:rPr>
+                <a:t>, </a:t>
+              </a:r>
+              <a:r>
+                <a:rPr lang="en-GB" sz="1600" dirty="0" err="1">
+                  <a:latin typeface="Montserrat" panose="00000500000000000000" pitchFamily="2" charset="0"/>
+                </a:rPr>
+                <a:t>Kashnikov</a:t>
+              </a:r>
+              <a:r>
+                <a:rPr lang="en-GB" sz="1600" dirty="0">
+                  <a:latin typeface="Montserrat" panose="00000500000000000000" pitchFamily="2" charset="0"/>
+                </a:rPr>
+                <a:t>, Y., and A. </a:t>
+              </a:r>
+              <a:r>
+                <a:rPr lang="en-GB" sz="1600" dirty="0" err="1">
+                  <a:latin typeface="Montserrat" panose="00000500000000000000" pitchFamily="2" charset="0"/>
+                </a:rPr>
+                <a:t>Memon</a:t>
+              </a:r>
+              <a:r>
+                <a:rPr lang="en-GB" sz="1600" dirty="0">
+                  <a:latin typeface="Montserrat" panose="00000500000000000000" pitchFamily="2" charset="0"/>
+                </a:rPr>
+                <a:t>, “Milepost GCC: Machine Learning Enabled Self-tuning Compiler,” Int J Parallel Prog, vol. 39, no. 3, pp. 296–327, 2011.</a:t>
+              </a:r>
+            </a:p>
+            <a:p>
+              <a:pPr>
+                <a:lnSpc>
+                  <a:spcPct val="150000"/>
+                </a:lnSpc>
+              </a:pPr>
+              <a:r>
+                <a:rPr lang="en-GB" sz="1600" dirty="0">
+                  <a:latin typeface="Montserrat" panose="00000500000000000000" pitchFamily="2" charset="0"/>
+                </a:rPr>
+                <a:t>[2]  Z. Pan and R. </a:t>
+              </a:r>
+              <a:r>
+                <a:rPr lang="en-GB" sz="1600" dirty="0" err="1">
+                  <a:latin typeface="Montserrat" panose="00000500000000000000" pitchFamily="2" charset="0"/>
+                </a:rPr>
+                <a:t>Eigenmann</a:t>
+              </a:r>
+              <a:r>
+                <a:rPr lang="en-GB" sz="1600" dirty="0">
+                  <a:latin typeface="Montserrat" panose="00000500000000000000" pitchFamily="2" charset="0"/>
+                </a:rPr>
+                <a:t>, “Fast and Effective Orchestration of Compiler Optimizations for Automatic Performance Tuning,” in Proceedings of the International Symposium on Code Generation and Optimization, ser. CGO ’06. New York, USA: IEEE Computer Society, 2006, pp. 319–332.</a:t>
+              </a:r>
+              <a:br>
+                <a:rPr lang="en-GB" sz="1600" dirty="0">
+                  <a:latin typeface="Montserrat" panose="00000500000000000000" pitchFamily="2" charset="0"/>
+                </a:rPr>
+              </a:br>
+              <a:r>
+                <a:rPr lang="en-GB" sz="1600" dirty="0">
+                  <a:latin typeface="Montserrat" panose="00000500000000000000" pitchFamily="2" charset="0"/>
+                </a:rPr>
+                <a:t>[3] J. Pallister, S. Hollis, and J. Bennett, “Identifying Compiler Options to Minimise Energy Consumption for Embedded Platforms,” The Computer Journal, vol. 58, no. 1, 2013.</a:t>
+              </a:r>
+            </a:p>
+            <a:p>
+              <a:pPr>
+                <a:lnSpc>
+                  <a:spcPct val="150000"/>
+                </a:lnSpc>
+              </a:pPr>
+              <a:r>
+                <a:rPr lang="en-GB" sz="1600" dirty="0">
+                  <a:latin typeface="Montserrat" panose="00000500000000000000" pitchFamily="2" charset="0"/>
+                </a:rPr>
+                <a:t>[4]  K. </a:t>
+              </a:r>
+              <a:r>
+                <a:rPr lang="en-GB" sz="1600" dirty="0" err="1">
+                  <a:latin typeface="Montserrat" panose="00000500000000000000" pitchFamily="2" charset="0"/>
+                </a:rPr>
+                <a:t>Asanovic</a:t>
+              </a:r>
+              <a:r>
+                <a:rPr lang="en-GB" sz="1600" dirty="0">
+                  <a:latin typeface="Montserrat" panose="00000500000000000000" pitchFamily="2" charset="0"/>
+                </a:rPr>
+                <a:t> et. Al. “The Landscape of Parallel Computing Research: A View from Berkeley,” Electrical Engineering and Computer Sciences, University of California at Berkeley, Technical Report UCB/EECS-2006-183, Dec. 2006. </a:t>
+              </a:r>
+            </a:p>
+          </p:txBody>
+        </p:sp>
+      </p:grpSp>
+      <p:grpSp>
+        <p:nvGrpSpPr>
+          <p:cNvPr id="33" name="Group 32">
+            <a:extLst>
+              <a:ext uri="{FF2B5EF4-FFF2-40B4-BE49-F238E27FC236}">
+                <a16:creationId xmlns:a16="http://schemas.microsoft.com/office/drawing/2014/main" id="{AA2C092C-57A1-4AB4-8A63-BF508C7B6654}"/>
+              </a:ext>
+            </a:extLst>
+          </p:cNvPr>
+          <p:cNvGrpSpPr/>
+          <p:nvPr/>
+        </p:nvGrpSpPr>
+        <p:grpSpPr>
+          <a:xfrm>
+            <a:off x="14063662" y="0"/>
+            <a:ext cx="7169349" cy="2630711"/>
+            <a:chOff x="76200" y="89192"/>
+            <a:chExt cx="7169349" cy="2630711"/>
+          </a:xfrm>
+        </p:grpSpPr>
+        <p:sp>
+          <p:nvSpPr>
+            <p:cNvPr id="2" name="TextBox 1">
+              <a:extLst>
+                <a:ext uri="{FF2B5EF4-FFF2-40B4-BE49-F238E27FC236}">
+                  <a16:creationId xmlns:a16="http://schemas.microsoft.com/office/drawing/2014/main" id="{14353EC0-7E56-4F56-B484-95CC57E1189A}"/>
+                </a:ext>
+              </a:extLst>
+            </p:cNvPr>
+            <p:cNvSpPr txBox="1"/>
+            <p:nvPr/>
+          </p:nvSpPr>
+          <p:spPr>
+            <a:xfrm>
+              <a:off x="76200" y="2082100"/>
+              <a:ext cx="7048500" cy="637803"/>
+            </a:xfrm>
+            <a:prstGeom prst="rect">
+              <a:avLst/>
+            </a:prstGeom>
+            <a:noFill/>
+          </p:spPr>
+          <p:txBody>
+            <a:bodyPr wrap="square" rtlCol="0">
+              <a:spAutoFit/>
+            </a:bodyPr>
+            <a:lstStyle/>
+            <a:p>
+              <a:pPr>
                 <a:lnSpc>
                   <a:spcPct val="125000"/>
                 </a:lnSpc>
-                <a:buFont typeface="Arial" panose="020B0604020202020204" pitchFamily="34" charset="0"/>
-                <a:buChar char="•"/>
               </a:pPr>
               <a:r>
-                <a:rPr lang="en-GB" sz="2400" dirty="0">
+                <a:rPr lang="en-GB" sz="3100" dirty="0">
+                  <a:solidFill>
+                    <a:schemeClr val="bg1"/>
+                  </a:solidFill>
                   <a:latin typeface="Montserrat" panose="00000500000000000000" pitchFamily="2" charset="0"/>
                 </a:rPr>
-                <a:t>Energy measurements are available through the Intel Running Average Power Limit (</a:t>
+                <a:t>Department of Computer Science</a:t>
               </a:r>
-              <a:r>
-                <a:rPr lang="en-GB" sz="2400" b="1" dirty="0">
-                  <a:latin typeface="Montserrat" panose="00000500000000000000" pitchFamily="2" charset="0"/>
-                </a:rPr>
-                <a:t>RAPL</a:t>
-              </a:r>
-              <a:r>
-                <a:rPr lang="en-GB" sz="2400" dirty="0">
-                  <a:latin typeface="Montserrat" panose="00000500000000000000" pitchFamily="2" charset="0"/>
-                </a:rPr>
-                <a:t>)  feature.</a:t>
-              </a:r>
-              <a:br>
-                <a:rPr lang="en-GB" sz="2400" dirty="0">
-                  <a:latin typeface="Montserrat" panose="00000500000000000000" pitchFamily="2" charset="0"/>
-                </a:rPr>
-              </a:br>
-              <a:endParaRPr lang="en-GB" sz="2400" dirty="0">
-                <a:latin typeface="Montserrat" panose="00000500000000000000" pitchFamily="2" charset="0"/>
-              </a:endParaRPr>
-            </a:p>
-            <a:p>
-              <a:pPr marL="342900" indent="-342900">
-                <a:lnSpc>
-                  <a:spcPct val="125000"/>
-                </a:lnSpc>
-                <a:buFont typeface="Arial" panose="020B0604020202020204" pitchFamily="34" charset="0"/>
-                <a:buChar char="•"/>
-              </a:pPr>
-              <a:r>
-                <a:rPr lang="en-GB" sz="2400" dirty="0">
-                  <a:latin typeface="Montserrat" panose="00000500000000000000" pitchFamily="2" charset="0"/>
-                </a:rPr>
-                <a:t>A C program has been written to measure energy consumption through RAPL</a:t>
-              </a:r>
-              <a:endParaRPr lang="en-GB" sz="2200" dirty="0">
-                <a:latin typeface="Montserrat" panose="00000500000000000000" pitchFamily="2" charset="0"/>
-              </a:endParaRPr>
             </a:p>
           </p:txBody>
         </p:sp>
+        <p:pic>
+          <p:nvPicPr>
+            <p:cNvPr id="32" name="Graphic 31">
+              <a:extLst>
+                <a:ext uri="{FF2B5EF4-FFF2-40B4-BE49-F238E27FC236}">
+                  <a16:creationId xmlns:a16="http://schemas.microsoft.com/office/drawing/2014/main" id="{ECDBFABF-4989-4F68-AE45-9646AB70166C}"/>
+                </a:ext>
+              </a:extLst>
+            </p:cNvPr>
+            <p:cNvPicPr>
+              <a:picLocks noChangeAspect="1"/>
+            </p:cNvPicPr>
+            <p:nvPr/>
+          </p:nvPicPr>
+          <p:blipFill>
+            <a:blip r:embed="rId2">
+              <a:extLst>
+                <a:ext uri="{28A0092B-C50C-407E-A947-70E740481C1C}">
+                  <a14:useLocalDpi xmlns:a14="http://schemas.microsoft.com/office/drawing/2010/main" val="0"/>
+                </a:ext>
+                <a:ext uri="{96DAC541-7B7A-43D3-8B79-37D633B846F1}">
+                  <asvg:svgBlip xmlns:asvg="http://schemas.microsoft.com/office/drawing/2016/SVG/main" r:embed="rId3"/>
+                </a:ext>
+              </a:extLst>
+            </a:blip>
+            <a:stretch>
+              <a:fillRect/>
+            </a:stretch>
+          </p:blipFill>
+          <p:spPr>
+            <a:xfrm>
+              <a:off x="197048" y="89192"/>
+              <a:ext cx="7048501" cy="2037346"/>
+            </a:xfrm>
+            <a:prstGeom prst="rect">
+              <a:avLst/>
+            </a:prstGeom>
+          </p:spPr>
+        </p:pic>
       </p:grpSp>
       <p:grpSp>
         <p:nvGrpSpPr>
@@ -3738,10 +4140,10 @@
         </p:nvGrpSpPr>
         <p:grpSpPr>
           <a:xfrm>
-            <a:off x="14404748" y="3478820"/>
-            <a:ext cx="5490000" cy="6205832"/>
+            <a:off x="14900044" y="3431593"/>
+            <a:ext cx="5490000" cy="7781583"/>
             <a:chOff x="7562850" y="3478820"/>
-            <a:chExt cx="5490000" cy="6205832"/>
+            <a:chExt cx="5490000" cy="7781583"/>
           </a:xfrm>
         </p:grpSpPr>
         <p:sp>
@@ -3806,7 +4208,7 @@
           <p:spPr>
             <a:xfrm>
               <a:off x="7562850" y="4126912"/>
-              <a:ext cx="5489972" cy="5557740"/>
+              <a:ext cx="5489972" cy="7133491"/>
             </a:xfrm>
             <a:prstGeom prst="rect">
               <a:avLst/>
@@ -3827,29 +4229,29 @@
                 <a:buChar char="•"/>
               </a:pPr>
               <a:r>
-                <a:rPr lang="en-GB" sz="2400" dirty="0">
+                <a:rPr lang="en-GB" sz="2300" dirty="0">
                   <a:latin typeface="Montserrat" panose="00000500000000000000" pitchFamily="2" charset="0"/>
                 </a:rPr>
-                <a:t>The iterative compilation algorithm </a:t>
+                <a:t>Iterative compilation algorithm </a:t>
               </a:r>
               <a:r>
-                <a:rPr lang="en-GB" sz="2400" b="1" dirty="0">
+                <a:rPr lang="en-GB" sz="2300" b="1" dirty="0">
                   <a:latin typeface="Montserrat" panose="00000500000000000000" pitchFamily="2" charset="0"/>
                 </a:rPr>
                 <a:t>Combined Elimination</a:t>
               </a:r>
               <a:r>
-                <a:rPr lang="en-GB" sz="2400" dirty="0">
+                <a:rPr lang="en-GB" sz="2300" dirty="0">
                   <a:latin typeface="Montserrat" panose="00000500000000000000" pitchFamily="2" charset="0"/>
                 </a:rPr>
-                <a:t> [2] is used to search the compiler optimisation space</a:t>
+                <a:t> [2] used to search compiler optimisation space.</a:t>
               </a:r>
               <a:br>
-                <a:rPr lang="en-GB" sz="2400" dirty="0">
+                <a:rPr lang="en-GB" sz="2300" dirty="0">
                   <a:latin typeface="Montserrat" panose="00000500000000000000" pitchFamily="2" charset="0"/>
                 </a:rPr>
               </a:br>
-              <a:endParaRPr lang="en-GB" sz="2400" dirty="0">
+              <a:endParaRPr lang="en-GB" sz="2300" dirty="0">
                 <a:latin typeface="Montserrat" panose="00000500000000000000" pitchFamily="2" charset="0"/>
               </a:endParaRPr>
             </a:p>
@@ -3862,17 +4264,17 @@
                 <a:buChar char="•"/>
               </a:pPr>
               <a:r>
-                <a:rPr lang="en-GB" sz="2400" dirty="0">
+                <a:rPr lang="en-GB" sz="2300" dirty="0">
                   <a:latin typeface="Montserrat" panose="00000500000000000000" pitchFamily="2" charset="0"/>
                 </a:rPr>
-                <a:t>Explores the how compiler optimisations affect energy, and time</a:t>
+                <a:t>Space is very large (195 optimisations in GCC 7.2). Cannot exhaustively search.</a:t>
               </a:r>
               <a:br>
-                <a:rPr lang="en-GB" sz="2400" dirty="0">
+                <a:rPr lang="en-GB" sz="2300" dirty="0">
                   <a:latin typeface="Montserrat" panose="00000500000000000000" pitchFamily="2" charset="0"/>
                 </a:rPr>
               </a:br>
-              <a:endParaRPr lang="en-GB" sz="2400" dirty="0">
+              <a:endParaRPr lang="en-GB" sz="2300" dirty="0">
                 <a:latin typeface="Montserrat" panose="00000500000000000000" pitchFamily="2" charset="0"/>
               </a:endParaRPr>
             </a:p>
@@ -3885,7 +4287,30 @@
                 <a:buChar char="•"/>
               </a:pPr>
               <a:r>
-                <a:rPr lang="en-GB" sz="2400" dirty="0">
+                <a:rPr lang="en-GB" sz="2300" dirty="0">
+                  <a:latin typeface="Montserrat" panose="00000500000000000000" pitchFamily="2" charset="0"/>
+                </a:rPr>
+                <a:t>Explores the how compiler optimisations affect energy and time.</a:t>
+              </a:r>
+              <a:br>
+                <a:rPr lang="en-GB" sz="2300" dirty="0">
+                  <a:latin typeface="Montserrat" panose="00000500000000000000" pitchFamily="2" charset="0"/>
+                </a:rPr>
+              </a:br>
+              <a:endParaRPr lang="en-GB" sz="2300" dirty="0">
+                <a:latin typeface="Montserrat" panose="00000500000000000000" pitchFamily="2" charset="0"/>
+              </a:endParaRPr>
+            </a:p>
+            <a:p>
+              <a:pPr marL="342900" indent="-342900">
+                <a:lnSpc>
+                  <a:spcPct val="125000"/>
+                </a:lnSpc>
+                <a:buFont typeface="Arial" panose="020B0604020202020204" pitchFamily="34" charset="0"/>
+                <a:buChar char="•"/>
+              </a:pPr>
+              <a:r>
+                <a:rPr lang="en-GB" sz="2300" dirty="0">
                   <a:latin typeface="Montserrat" panose="00000500000000000000" pitchFamily="2" charset="0"/>
                 </a:rPr>
                 <a:t>Provides training data for machine learning techniques.</a:t>
@@ -3897,157 +4322,19 @@
                   <a:spcPct val="125000"/>
                 </a:lnSpc>
               </a:pPr>
-              <a:endParaRPr lang="en-GB" sz="2200" dirty="0">
+              <a:endParaRPr lang="en-GB" sz="2300" dirty="0">
                 <a:latin typeface="Montserrat" panose="00000500000000000000" pitchFamily="2" charset="0"/>
               </a:endParaRPr>
             </a:p>
           </p:txBody>
         </p:sp>
       </p:grpSp>
-      <p:sp>
-        <p:nvSpPr>
-          <p:cNvPr id="18" name="TextBox 17">
+      <p:grpSp>
+        <p:nvGrpSpPr>
+          <p:cNvPr id="44" name="Group 43">
             <a:extLst>
               <a:ext uri="{FF2B5EF4-FFF2-40B4-BE49-F238E27FC236}">
-                <a16:creationId xmlns:a16="http://schemas.microsoft.com/office/drawing/2014/main" id="{6E355220-0461-42E2-81F4-C0A5825888F3}"/>
-              </a:ext>
-            </a:extLst>
-          </p:cNvPr>
-          <p:cNvSpPr txBox="1"/>
-          <p:nvPr/>
-        </p:nvSpPr>
-        <p:spPr>
-          <a:xfrm>
-            <a:off x="453627" y="25756407"/>
-            <a:ext cx="19080955" cy="2210670"/>
-          </a:xfrm>
-          <a:prstGeom prst="rect">
-            <a:avLst/>
-          </a:prstGeom>
-          <a:noFill/>
-        </p:spPr>
-        <p:txBody>
-          <a:bodyPr wrap="square" rtlCol="0">
-            <a:spAutoFit/>
-          </a:bodyPr>
-          <a:lstStyle/>
-          <a:p>
-            <a:pPr>
-              <a:lnSpc>
-                <a:spcPct val="125000"/>
-              </a:lnSpc>
-            </a:pPr>
-            <a:r>
-              <a:rPr lang="en-GB" dirty="0">
-                <a:latin typeface="Montserrat" panose="00000500000000000000" pitchFamily="2" charset="0"/>
-              </a:rPr>
-              <a:t>[1]  Z. Pan and R. </a:t>
-            </a:r>
-            <a:r>
-              <a:rPr lang="en-GB" dirty="0" err="1">
-                <a:latin typeface="Montserrat" panose="00000500000000000000" pitchFamily="2" charset="0"/>
-              </a:rPr>
-              <a:t>Eigenmann</a:t>
-            </a:r>
-            <a:r>
-              <a:rPr lang="en-GB" dirty="0">
-                <a:latin typeface="Montserrat" panose="00000500000000000000" pitchFamily="2" charset="0"/>
-              </a:rPr>
-              <a:t>, “Fast and Effective Orchestration of Compiler Optimizations for Automatic Performance Tuning,” in Proceedings of the International Symposium on Code Generation and Optimization, ser. CGO ’06. New York, USA: IEEE Computer Society, 2006, pp. 319–332.</a:t>
-            </a:r>
-          </a:p>
-          <a:p>
-            <a:pPr>
-              <a:lnSpc>
-                <a:spcPct val="125000"/>
-              </a:lnSpc>
-            </a:pPr>
-            <a:r>
-              <a:rPr lang="en-GB" dirty="0">
-                <a:latin typeface="Montserrat" panose="00000500000000000000" pitchFamily="2" charset="0"/>
-              </a:rPr>
-              <a:t>[1]  G. </a:t>
-            </a:r>
-            <a:r>
-              <a:rPr lang="en-GB" dirty="0" err="1">
-                <a:latin typeface="Montserrat" panose="00000500000000000000" pitchFamily="2" charset="0"/>
-              </a:rPr>
-              <a:t>Fursin</a:t>
-            </a:r>
-            <a:r>
-              <a:rPr lang="en-GB" dirty="0">
-                <a:latin typeface="Montserrat" panose="00000500000000000000" pitchFamily="2" charset="0"/>
-              </a:rPr>
-              <a:t>, </a:t>
-            </a:r>
-            <a:r>
-              <a:rPr lang="en-GB" dirty="0" err="1">
-                <a:latin typeface="Montserrat" panose="00000500000000000000" pitchFamily="2" charset="0"/>
-              </a:rPr>
-              <a:t>Kashnikov</a:t>
-            </a:r>
-            <a:r>
-              <a:rPr lang="en-GB" dirty="0">
-                <a:latin typeface="Montserrat" panose="00000500000000000000" pitchFamily="2" charset="0"/>
-              </a:rPr>
-              <a:t>, Y., and A. </a:t>
-            </a:r>
-            <a:r>
-              <a:rPr lang="en-GB" dirty="0" err="1">
-                <a:latin typeface="Montserrat" panose="00000500000000000000" pitchFamily="2" charset="0"/>
-              </a:rPr>
-              <a:t>Memon</a:t>
-            </a:r>
-            <a:r>
-              <a:rPr lang="en-GB" dirty="0">
-                <a:latin typeface="Montserrat" panose="00000500000000000000" pitchFamily="2" charset="0"/>
-              </a:rPr>
-              <a:t>, “Milepost GCC: Machine Learning Enabled Self-tuning Compiler,” Int J Parallel Prog, vol. 39, no. 3, pp. 296–327, 2011.</a:t>
-            </a:r>
-          </a:p>
-          <a:p>
-            <a:pPr>
-              <a:lnSpc>
-                <a:spcPct val="125000"/>
-              </a:lnSpc>
-            </a:pPr>
-            <a:r>
-              <a:rPr lang="en-GB" dirty="0">
-                <a:latin typeface="Montserrat" panose="00000500000000000000" pitchFamily="2" charset="0"/>
-              </a:rPr>
-              <a:t>[2]  K. </a:t>
-            </a:r>
-            <a:r>
-              <a:rPr lang="en-GB" dirty="0" err="1">
-                <a:latin typeface="Montserrat" panose="00000500000000000000" pitchFamily="2" charset="0"/>
-              </a:rPr>
-              <a:t>Asanovic</a:t>
-            </a:r>
-            <a:r>
-              <a:rPr lang="en-GB" dirty="0">
-                <a:latin typeface="Montserrat" panose="00000500000000000000" pitchFamily="2" charset="0"/>
-              </a:rPr>
-              <a:t> et. Al. “The Landscape of Parallel Computing Research: A View from Berkeley,” Electrical Engineering and Computer Sciences, University of California at Berkeley, Technical Report UCB/EECS-2006-183, Dec. 2006. </a:t>
-            </a:r>
-          </a:p>
-          <a:p>
-            <a:pPr>
-              <a:lnSpc>
-                <a:spcPct val="125000"/>
-              </a:lnSpc>
-            </a:pPr>
-            <a:endParaRPr lang="en-GB" sz="2200" dirty="0">
-              <a:latin typeface="Montserrat" panose="00000500000000000000" pitchFamily="2" charset="0"/>
-            </a:endParaRPr>
-          </a:p>
-        </p:txBody>
-      </p:sp>
-      <p:grpSp>
-        <p:nvGrpSpPr>
-          <p:cNvPr id="24" name="Group 23">
-            <a:extLst>
-              <a:ext uri="{FF2B5EF4-FFF2-40B4-BE49-F238E27FC236}">
-                <a16:creationId xmlns:a16="http://schemas.microsoft.com/office/drawing/2014/main" id="{4B1CACF7-4515-49C7-A470-EA0E9E33F26E}"/>
+                <a16:creationId xmlns:a16="http://schemas.microsoft.com/office/drawing/2014/main" id="{25854DBA-748B-4B08-A6ED-C9302FDDD6F4}"/>
               </a:ext>
             </a:extLst>
           </p:cNvPr>
@@ -4056,18 +4343,292 @@
         </p:nvGrpSpPr>
         <p:grpSpPr>
           <a:xfrm>
-            <a:off x="14431566" y="9245395"/>
-            <a:ext cx="5490000" cy="4393817"/>
-            <a:chOff x="14538098" y="3463128"/>
-            <a:chExt cx="5490000" cy="4393817"/>
+            <a:off x="8101742" y="3431593"/>
+            <a:ext cx="5489973" cy="11499801"/>
+            <a:chOff x="7442597" y="8588484"/>
+            <a:chExt cx="5489973" cy="11499801"/>
+          </a:xfrm>
+        </p:grpSpPr>
+        <p:grpSp>
+          <p:nvGrpSpPr>
+            <p:cNvPr id="28" name="Group 27">
+              <a:extLst>
+                <a:ext uri="{FF2B5EF4-FFF2-40B4-BE49-F238E27FC236}">
+                  <a16:creationId xmlns:a16="http://schemas.microsoft.com/office/drawing/2014/main" id="{27FC04AE-8502-494A-A8AB-F253B4B136EF}"/>
+                </a:ext>
+              </a:extLst>
+            </p:cNvPr>
+            <p:cNvGrpSpPr/>
+            <p:nvPr/>
+          </p:nvGrpSpPr>
+          <p:grpSpPr>
+            <a:xfrm>
+              <a:off x="7442597" y="8588484"/>
+              <a:ext cx="5489973" cy="3841862"/>
+              <a:chOff x="453627" y="13415270"/>
+              <a:chExt cx="5489973" cy="3841862"/>
+            </a:xfrm>
+          </p:grpSpPr>
+          <p:sp>
+            <p:nvSpPr>
+              <p:cNvPr id="29" name="TextBox 28">
+                <a:extLst>
+                  <a:ext uri="{FF2B5EF4-FFF2-40B4-BE49-F238E27FC236}">
+                    <a16:creationId xmlns:a16="http://schemas.microsoft.com/office/drawing/2014/main" id="{195C263C-A1CE-4AEC-9C36-E468FF55A0D2}"/>
+                  </a:ext>
+                </a:extLst>
+              </p:cNvPr>
+              <p:cNvSpPr txBox="1"/>
+              <p:nvPr/>
+            </p:nvSpPr>
+            <p:spPr>
+              <a:xfrm>
+                <a:off x="453628" y="13415270"/>
+                <a:ext cx="5489972" cy="625684"/>
+              </a:xfrm>
+              <a:prstGeom prst="rect">
+                <a:avLst/>
+              </a:prstGeom>
+              <a:solidFill>
+                <a:srgbClr val="235078"/>
+              </a:solidFill>
+            </p:spPr>
+            <p:txBody>
+              <a:bodyPr wrap="square" rtlCol="0">
+                <a:spAutoFit/>
+              </a:bodyPr>
+              <a:lstStyle/>
+              <a:p>
+                <a:pPr>
+                  <a:lnSpc>
+                    <a:spcPct val="125000"/>
+                  </a:lnSpc>
+                </a:pPr>
+                <a:r>
+                  <a:rPr lang="en-GB" sz="3000" b="1" dirty="0">
+                    <a:solidFill>
+                      <a:schemeClr val="bg1"/>
+                    </a:solidFill>
+                    <a:latin typeface="Libre Baskerville" panose="02000000000000000000" pitchFamily="2" charset="0"/>
+                  </a:rPr>
+                  <a:t>Benchmark Programs</a:t>
+                </a:r>
+              </a:p>
+            </p:txBody>
+          </p:sp>
+          <p:sp>
+            <p:nvSpPr>
+              <p:cNvPr id="30" name="TextBox 29">
+                <a:extLst>
+                  <a:ext uri="{FF2B5EF4-FFF2-40B4-BE49-F238E27FC236}">
+                    <a16:creationId xmlns:a16="http://schemas.microsoft.com/office/drawing/2014/main" id="{1947FD71-3340-4327-9298-DC2CE48B48EE}"/>
+                  </a:ext>
+                </a:extLst>
+              </p:cNvPr>
+              <p:cNvSpPr txBox="1"/>
+              <p:nvPr/>
+            </p:nvSpPr>
+            <p:spPr>
+              <a:xfrm>
+                <a:off x="453627" y="14105500"/>
+                <a:ext cx="5489972" cy="3151632"/>
+              </a:xfrm>
+              <a:prstGeom prst="rect">
+                <a:avLst/>
+              </a:prstGeom>
+              <a:noFill/>
+            </p:spPr>
+            <p:txBody>
+              <a:bodyPr wrap="square" rtlCol="0">
+                <a:spAutoFit/>
+              </a:bodyPr>
+              <a:lstStyle/>
+              <a:p>
+                <a:pPr marL="342900" indent="-342900">
+                  <a:lnSpc>
+                    <a:spcPct val="125000"/>
+                  </a:lnSpc>
+                  <a:buFont typeface="Arial" panose="020B0604020202020204" pitchFamily="34" charset="0"/>
+                  <a:buChar char="•"/>
+                </a:pPr>
+                <a:r>
+                  <a:rPr lang="en-GB" sz="2300" dirty="0">
+                    <a:latin typeface="Montserrat" panose="00000500000000000000" pitchFamily="2" charset="0"/>
+                  </a:rPr>
+                  <a:t>Using </a:t>
+                </a:r>
+                <a:r>
+                  <a:rPr lang="en-GB" sz="2300" b="1" dirty="0">
+                    <a:latin typeface="Montserrat" panose="00000500000000000000" pitchFamily="2" charset="0"/>
+                  </a:rPr>
+                  <a:t>OpenMP</a:t>
+                </a:r>
+                <a:r>
+                  <a:rPr lang="en-GB" sz="2300" dirty="0">
+                    <a:latin typeface="Montserrat" panose="00000500000000000000" pitchFamily="2" charset="0"/>
+                  </a:rPr>
+                  <a:t> benchmark suites</a:t>
+                </a:r>
+              </a:p>
+              <a:p>
+                <a:pPr marL="800100" lvl="1" indent="-342900">
+                  <a:lnSpc>
+                    <a:spcPct val="125000"/>
+                  </a:lnSpc>
+                  <a:buFont typeface="Arial" panose="020B0604020202020204" pitchFamily="34" charset="0"/>
+                  <a:buChar char="•"/>
+                </a:pPr>
+                <a:r>
+                  <a:rPr lang="en-GB" sz="2300" dirty="0">
+                    <a:latin typeface="Montserrat" panose="00000500000000000000" pitchFamily="2" charset="0"/>
+                  </a:rPr>
+                  <a:t>NAS Parallel Benchmarks</a:t>
+                </a:r>
+              </a:p>
+              <a:p>
+                <a:pPr marL="800100" lvl="1" indent="-342900">
+                  <a:lnSpc>
+                    <a:spcPct val="125000"/>
+                  </a:lnSpc>
+                  <a:buFont typeface="Arial" panose="020B0604020202020204" pitchFamily="34" charset="0"/>
+                  <a:buChar char="•"/>
+                </a:pPr>
+                <a:r>
+                  <a:rPr lang="en-GB" sz="2300" dirty="0">
+                    <a:latin typeface="Montserrat" panose="00000500000000000000" pitchFamily="2" charset="0"/>
+                  </a:rPr>
+                  <a:t>SPEC OMP2012</a:t>
+                </a:r>
+              </a:p>
+              <a:p>
+                <a:pPr marL="342900" indent="-342900">
+                  <a:lnSpc>
+                    <a:spcPct val="125000"/>
+                  </a:lnSpc>
+                  <a:buFont typeface="Arial" panose="020B0604020202020204" pitchFamily="34" charset="0"/>
+                  <a:buChar char="•"/>
+                </a:pPr>
+                <a:r>
+                  <a:rPr lang="en-GB" sz="2300" dirty="0">
+                    <a:latin typeface="Montserrat" panose="00000500000000000000" pitchFamily="2" charset="0"/>
+                  </a:rPr>
+                  <a:t>Subset of benchmarks chosen based on </a:t>
+                </a:r>
+                <a:r>
+                  <a:rPr lang="en-GB" sz="2300" b="1" dirty="0">
+                    <a:latin typeface="Montserrat" panose="00000500000000000000" pitchFamily="2" charset="0"/>
+                  </a:rPr>
+                  <a:t>stability</a:t>
+                </a:r>
+                <a:r>
+                  <a:rPr lang="en-GB" sz="2300" dirty="0">
+                    <a:latin typeface="Montserrat" panose="00000500000000000000" pitchFamily="2" charset="0"/>
+                  </a:rPr>
+                  <a:t> of runtime and energy: </a:t>
+                </a:r>
+              </a:p>
+            </p:txBody>
+          </p:sp>
+        </p:grpSp>
+        <p:pic>
+          <p:nvPicPr>
+            <p:cNvPr id="41" name="Picture 40">
+              <a:extLst>
+                <a:ext uri="{FF2B5EF4-FFF2-40B4-BE49-F238E27FC236}">
+                  <a16:creationId xmlns:a16="http://schemas.microsoft.com/office/drawing/2014/main" id="{7A7E356E-1B0D-4827-8BCD-96047BA97491}"/>
+                </a:ext>
+              </a:extLst>
+            </p:cNvPr>
+            <p:cNvPicPr>
+              <a:picLocks noChangeAspect="1"/>
+            </p:cNvPicPr>
+            <p:nvPr/>
+          </p:nvPicPr>
+          <p:blipFill>
+            <a:blip r:embed="rId4">
+              <a:extLst>
+                <a:ext uri="{28A0092B-C50C-407E-A947-70E740481C1C}">
+                  <a14:useLocalDpi xmlns:a14="http://schemas.microsoft.com/office/drawing/2010/main" val="0"/>
+                </a:ext>
+              </a:extLst>
+            </a:blip>
+            <a:stretch>
+              <a:fillRect/>
+            </a:stretch>
+          </p:blipFill>
+          <p:spPr>
+            <a:xfrm>
+              <a:off x="7442598" y="16319860"/>
+              <a:ext cx="5489971" cy="3768425"/>
+            </a:xfrm>
+            <a:prstGeom prst="rect">
+              <a:avLst/>
+            </a:prstGeom>
+          </p:spPr>
+        </p:pic>
+        <p:pic>
+          <p:nvPicPr>
+            <p:cNvPr id="43" name="Picture 42">
+              <a:extLst>
+                <a:ext uri="{FF2B5EF4-FFF2-40B4-BE49-F238E27FC236}">
+                  <a16:creationId xmlns:a16="http://schemas.microsoft.com/office/drawing/2014/main" id="{A8312505-1087-4628-8C08-E2D676CB74C1}"/>
+                </a:ext>
+              </a:extLst>
+            </p:cNvPr>
+            <p:cNvPicPr>
+              <a:picLocks noChangeAspect="1"/>
+            </p:cNvPicPr>
+            <p:nvPr/>
+          </p:nvPicPr>
+          <p:blipFill>
+            <a:blip r:embed="rId5">
+              <a:extLst>
+                <a:ext uri="{28A0092B-C50C-407E-A947-70E740481C1C}">
+                  <a14:useLocalDpi xmlns:a14="http://schemas.microsoft.com/office/drawing/2010/main" val="0"/>
+                </a:ext>
+              </a:extLst>
+            </a:blip>
+            <a:stretch>
+              <a:fillRect/>
+            </a:stretch>
+          </p:blipFill>
+          <p:spPr>
+            <a:xfrm>
+              <a:off x="7447174" y="12534217"/>
+              <a:ext cx="5485395" cy="3802843"/>
+            </a:xfrm>
+            <a:prstGeom prst="rect">
+              <a:avLst/>
+            </a:prstGeom>
+          </p:spPr>
+        </p:pic>
+      </p:grpSp>
+      <p:grpSp>
+        <p:nvGrpSpPr>
+          <p:cNvPr id="62" name="Group 61">
+            <a:extLst>
+              <a:ext uri="{FF2B5EF4-FFF2-40B4-BE49-F238E27FC236}">
+                <a16:creationId xmlns:a16="http://schemas.microsoft.com/office/drawing/2014/main" id="{451C2698-8797-4AD7-BC4C-1C45E575DB09}"/>
+              </a:ext>
+            </a:extLst>
+          </p:cNvPr>
+          <p:cNvGrpSpPr/>
+          <p:nvPr/>
+        </p:nvGrpSpPr>
+        <p:grpSpPr>
+          <a:xfrm>
+            <a:off x="1105678" y="15473800"/>
+            <a:ext cx="5489973" cy="6970420"/>
+            <a:chOff x="1105677" y="15010356"/>
+            <a:chExt cx="5489973" cy="6970420"/>
           </a:xfrm>
         </p:grpSpPr>
         <p:sp>
           <p:nvSpPr>
-            <p:cNvPr id="19" name="TextBox 18">
+            <p:cNvPr id="15" name="TextBox 14">
               <a:extLst>
                 <a:ext uri="{FF2B5EF4-FFF2-40B4-BE49-F238E27FC236}">
-                  <a16:creationId xmlns:a16="http://schemas.microsoft.com/office/drawing/2014/main" id="{6F42FF15-B0AA-4D29-9213-D91C2E19909C}"/>
+                  <a16:creationId xmlns:a16="http://schemas.microsoft.com/office/drawing/2014/main" id="{36583889-AC97-4BEC-AC3F-F44E37930580}"/>
                 </a:ext>
               </a:extLst>
             </p:cNvPr>
@@ -4076,8 +4637,145 @@
           </p:nvSpPr>
           <p:spPr>
             <a:xfrm>
-              <a:off x="14538098" y="3463128"/>
-              <a:ext cx="5490000" cy="625684"/>
+              <a:off x="1105678" y="15732142"/>
+              <a:ext cx="5489972" cy="6248634"/>
+            </a:xfrm>
+            <a:prstGeom prst="rect">
+              <a:avLst/>
+            </a:prstGeom>
+            <a:noFill/>
+          </p:spPr>
+          <p:txBody>
+            <a:bodyPr wrap="square" rtlCol="0">
+              <a:spAutoFit/>
+            </a:bodyPr>
+            <a:lstStyle/>
+            <a:p>
+              <a:pPr marL="342900" indent="-342900">
+                <a:lnSpc>
+                  <a:spcPct val="125000"/>
+                </a:lnSpc>
+                <a:buFont typeface="Arial" panose="020B0604020202020204" pitchFamily="34" charset="0"/>
+                <a:buChar char="•"/>
+              </a:pPr>
+              <a:r>
+                <a:rPr lang="en-GB" sz="2300" dirty="0">
+                  <a:latin typeface="Montserrat" panose="00000500000000000000" pitchFamily="2" charset="0"/>
+                </a:rPr>
+                <a:t>Energy measurements available through the Intel Running Average Power Limit (</a:t>
+              </a:r>
+              <a:r>
+                <a:rPr lang="en-GB" sz="2300" b="1" dirty="0">
+                  <a:latin typeface="Montserrat" panose="00000500000000000000" pitchFamily="2" charset="0"/>
+                </a:rPr>
+                <a:t>RAPL</a:t>
+              </a:r>
+              <a:r>
+                <a:rPr lang="en-GB" sz="2300" dirty="0">
+                  <a:latin typeface="Montserrat" panose="00000500000000000000" pitchFamily="2" charset="0"/>
+                </a:rPr>
+                <a:t>)  feature.</a:t>
+              </a:r>
+              <a:br>
+                <a:rPr lang="en-GB" sz="2300" dirty="0">
+                  <a:latin typeface="Montserrat" panose="00000500000000000000" pitchFamily="2" charset="0"/>
+                </a:rPr>
+              </a:br>
+              <a:endParaRPr lang="en-GB" sz="2300" dirty="0">
+                <a:latin typeface="Montserrat" panose="00000500000000000000" pitchFamily="2" charset="0"/>
+              </a:endParaRPr>
+            </a:p>
+            <a:p>
+              <a:pPr marL="342900" indent="-342900">
+                <a:lnSpc>
+                  <a:spcPct val="125000"/>
+                </a:lnSpc>
+                <a:buFont typeface="Arial" panose="020B0604020202020204" pitchFamily="34" charset="0"/>
+                <a:buChar char="•"/>
+              </a:pPr>
+              <a:r>
+                <a:rPr lang="en-GB" sz="2300" dirty="0">
+                  <a:latin typeface="Montserrat" panose="00000500000000000000" pitchFamily="2" charset="0"/>
+                </a:rPr>
+                <a:t>Measures processor package and DRAM energy consumption.</a:t>
+              </a:r>
+              <a:br>
+                <a:rPr lang="en-GB" sz="2300" dirty="0">
+                  <a:latin typeface="Montserrat" panose="00000500000000000000" pitchFamily="2" charset="0"/>
+                </a:rPr>
+              </a:br>
+              <a:endParaRPr lang="en-GB" sz="2300" dirty="0">
+                <a:latin typeface="Montserrat" panose="00000500000000000000" pitchFamily="2" charset="0"/>
+              </a:endParaRPr>
+            </a:p>
+            <a:p>
+              <a:pPr marL="342900" indent="-342900">
+                <a:lnSpc>
+                  <a:spcPct val="125000"/>
+                </a:lnSpc>
+                <a:buFont typeface="Arial" panose="020B0604020202020204" pitchFamily="34" charset="0"/>
+                <a:buChar char="•"/>
+              </a:pPr>
+              <a:r>
+                <a:rPr lang="en-GB" sz="2300" dirty="0">
+                  <a:latin typeface="Montserrat" panose="00000500000000000000" pitchFamily="2" charset="0"/>
+                </a:rPr>
+                <a:t>Energy monitoring tool written in C.</a:t>
+              </a:r>
+              <a:br>
+                <a:rPr lang="en-GB" sz="2300" dirty="0">
+                  <a:latin typeface="Montserrat" panose="00000500000000000000" pitchFamily="2" charset="0"/>
+                </a:rPr>
+              </a:br>
+              <a:endParaRPr lang="en-GB" sz="2300" dirty="0">
+                <a:latin typeface="Montserrat" panose="00000500000000000000" pitchFamily="2" charset="0"/>
+              </a:endParaRPr>
+            </a:p>
+            <a:p>
+              <a:pPr marL="342900" indent="-342900">
+                <a:lnSpc>
+                  <a:spcPct val="125000"/>
+                </a:lnSpc>
+                <a:buFont typeface="Arial" panose="020B0604020202020204" pitchFamily="34" charset="0"/>
+                <a:buChar char="•"/>
+              </a:pPr>
+              <a:r>
+                <a:rPr lang="en-GB" sz="2300" dirty="0">
+                  <a:latin typeface="Montserrat" panose="00000500000000000000" pitchFamily="2" charset="0"/>
+                </a:rPr>
+                <a:t>Multiple versions of monitoring tool developed and tested for </a:t>
+              </a:r>
+              <a:r>
+                <a:rPr lang="en-GB" sz="2300" b="1" dirty="0">
+                  <a:latin typeface="Montserrat" panose="00000500000000000000" pitchFamily="2" charset="0"/>
+                </a:rPr>
+                <a:t>stability</a:t>
+              </a:r>
+              <a:r>
+                <a:rPr lang="en-GB" sz="2300" dirty="0">
+                  <a:latin typeface="Montserrat" panose="00000500000000000000" pitchFamily="2" charset="0"/>
+                </a:rPr>
+                <a:t>:</a:t>
+              </a:r>
+            </a:p>
+          </p:txBody>
+        </p:sp>
+        <p:sp>
+          <p:nvSpPr>
+            <p:cNvPr id="51" name="TextBox 50">
+              <a:extLst>
+                <a:ext uri="{FF2B5EF4-FFF2-40B4-BE49-F238E27FC236}">
+                  <a16:creationId xmlns:a16="http://schemas.microsoft.com/office/drawing/2014/main" id="{EFAD6EDA-81D5-42A1-B56C-0ED7E7C7735A}"/>
+                </a:ext>
+              </a:extLst>
+            </p:cNvPr>
+            <p:cNvSpPr txBox="1"/>
+            <p:nvPr/>
+          </p:nvSpPr>
+          <p:spPr>
+            <a:xfrm>
+              <a:off x="1105677" y="15010356"/>
+              <a:ext cx="5485396" cy="625684"/>
             </a:xfrm>
             <a:prstGeom prst="rect">
               <a:avLst/>
@@ -4104,109 +4802,271 @@
                   </a:solidFill>
                   <a:latin typeface="Libre Baskerville" panose="02000000000000000000" pitchFamily="2" charset="0"/>
                 </a:rPr>
-                <a:t>Machine Learning</a:t>
-              </a:r>
-            </a:p>
-          </p:txBody>
-        </p:sp>
-        <p:sp>
-          <p:nvSpPr>
-            <p:cNvPr id="20" name="TextBox 19">
-              <a:extLst>
-                <a:ext uri="{FF2B5EF4-FFF2-40B4-BE49-F238E27FC236}">
-                  <a16:creationId xmlns:a16="http://schemas.microsoft.com/office/drawing/2014/main" id="{E3624357-620E-4395-A722-CFCCD05ACA7A}"/>
-                </a:ext>
-              </a:extLst>
-            </p:cNvPr>
-            <p:cNvSpPr txBox="1"/>
-            <p:nvPr/>
-          </p:nvSpPr>
-          <p:spPr>
-            <a:xfrm>
-              <a:off x="14538126" y="4110663"/>
-              <a:ext cx="5489972" cy="3746282"/>
-            </a:xfrm>
-            <a:prstGeom prst="rect">
-              <a:avLst/>
-            </a:prstGeom>
-            <a:noFill/>
-          </p:spPr>
-          <p:txBody>
-            <a:bodyPr wrap="square" rtlCol="0">
-              <a:spAutoFit/>
-            </a:bodyPr>
-            <a:lstStyle/>
-            <a:p>
-              <a:pPr marL="342900" indent="-342900">
-                <a:lnSpc>
-                  <a:spcPct val="125000"/>
-                </a:lnSpc>
-                <a:buFont typeface="Arial" panose="020B0604020202020204" pitchFamily="34" charset="0"/>
-                <a:buChar char="•"/>
-              </a:pPr>
-              <a:r>
-                <a:rPr lang="en-GB" sz="2400" dirty="0">
-                  <a:latin typeface="Montserrat" panose="00000500000000000000" pitchFamily="2" charset="0"/>
-                </a:rPr>
-                <a:t>This project will use the </a:t>
-              </a:r>
-              <a:r>
-                <a:rPr lang="en-GB" sz="2400" b="1" dirty="0">
-                  <a:latin typeface="Montserrat" panose="00000500000000000000" pitchFamily="2" charset="0"/>
-                </a:rPr>
-                <a:t>1-Neaest-Neigbour</a:t>
-              </a:r>
-              <a:r>
-                <a:rPr lang="en-GB" sz="2400" dirty="0">
-                  <a:latin typeface="Montserrat" panose="00000500000000000000" pitchFamily="2" charset="0"/>
-                </a:rPr>
-                <a:t> (1NN) technique used in the Milepost study [1] </a:t>
-              </a:r>
-              <a:br>
-                <a:rPr lang="en-GB" sz="2400" dirty="0">
-                  <a:latin typeface="Montserrat" panose="00000500000000000000" pitchFamily="2" charset="0"/>
-                </a:rPr>
-              </a:br>
-              <a:endParaRPr lang="en-GB" sz="2400" dirty="0">
-                <a:latin typeface="Montserrat" panose="00000500000000000000" pitchFamily="2" charset="0"/>
-              </a:endParaRPr>
-            </a:p>
-            <a:p>
-              <a:pPr marL="342900" indent="-342900">
-                <a:lnSpc>
-                  <a:spcPct val="125000"/>
-                </a:lnSpc>
-                <a:buFont typeface="Arial" panose="020B0604020202020204" pitchFamily="34" charset="0"/>
-                <a:buChar char="•"/>
-              </a:pPr>
-              <a:r>
-                <a:rPr lang="en-GB" sz="2400" dirty="0">
-                  <a:latin typeface="Montserrat" panose="00000500000000000000" pitchFamily="2" charset="0"/>
-                </a:rPr>
-                <a:t>This project will explore a new feature using the </a:t>
-              </a:r>
-              <a:r>
-                <a:rPr lang="en-GB" sz="2400" b="1" dirty="0">
-                  <a:latin typeface="Montserrat" panose="00000500000000000000" pitchFamily="2" charset="0"/>
-                </a:rPr>
-                <a:t>Seven Dwarfs </a:t>
-              </a:r>
-              <a:r>
-                <a:rPr lang="en-GB" sz="2400" dirty="0">
-                  <a:latin typeface="Montserrat" panose="00000500000000000000" pitchFamily="2" charset="0"/>
-                </a:rPr>
-                <a:t>classification system [3].</a:t>
+                <a:t>Energy Measurements</a:t>
               </a:r>
             </a:p>
           </p:txBody>
         </p:sp>
       </p:grpSp>
+      <p:grpSp>
+        <p:nvGrpSpPr>
+          <p:cNvPr id="61" name="Group 60">
+            <a:extLst>
+              <a:ext uri="{FF2B5EF4-FFF2-40B4-BE49-F238E27FC236}">
+                <a16:creationId xmlns:a16="http://schemas.microsoft.com/office/drawing/2014/main" id="{5F15EB70-DCD1-4505-80BD-1FFB9F5AB8D2}"/>
+              </a:ext>
+            </a:extLst>
+          </p:cNvPr>
+          <p:cNvGrpSpPr/>
+          <p:nvPr/>
+        </p:nvGrpSpPr>
+        <p:grpSpPr>
+          <a:xfrm>
+            <a:off x="8101742" y="15466548"/>
+            <a:ext cx="5489972" cy="10969446"/>
+            <a:chOff x="8101742" y="15010670"/>
+            <a:chExt cx="5489972" cy="10969446"/>
+          </a:xfrm>
+        </p:grpSpPr>
+        <p:grpSp>
+          <p:nvGrpSpPr>
+            <p:cNvPr id="42" name="Group 41">
+              <a:extLst>
+                <a:ext uri="{FF2B5EF4-FFF2-40B4-BE49-F238E27FC236}">
+                  <a16:creationId xmlns:a16="http://schemas.microsoft.com/office/drawing/2014/main" id="{6E2518FC-D32D-4ECA-95AF-2A6894967AC1}"/>
+                </a:ext>
+              </a:extLst>
+            </p:cNvPr>
+            <p:cNvGrpSpPr/>
+            <p:nvPr/>
+          </p:nvGrpSpPr>
+          <p:grpSpPr>
+            <a:xfrm>
+              <a:off x="8101742" y="15010670"/>
+              <a:ext cx="5489972" cy="6977162"/>
+              <a:chOff x="453627" y="13376972"/>
+              <a:chExt cx="5489972" cy="6977162"/>
+            </a:xfrm>
+          </p:grpSpPr>
+          <p:sp>
+            <p:nvSpPr>
+              <p:cNvPr id="49" name="TextBox 48">
+                <a:extLst>
+                  <a:ext uri="{FF2B5EF4-FFF2-40B4-BE49-F238E27FC236}">
+                    <a16:creationId xmlns:a16="http://schemas.microsoft.com/office/drawing/2014/main" id="{16117C86-D10D-48C9-A27A-BF1715A17C64}"/>
+                  </a:ext>
+                </a:extLst>
+              </p:cNvPr>
+              <p:cNvSpPr txBox="1"/>
+              <p:nvPr/>
+            </p:nvSpPr>
+            <p:spPr>
+              <a:xfrm>
+                <a:off x="453627" y="13376972"/>
+                <a:ext cx="5485396" cy="625684"/>
+              </a:xfrm>
+              <a:prstGeom prst="rect">
+                <a:avLst/>
+              </a:prstGeom>
+              <a:solidFill>
+                <a:srgbClr val="235078"/>
+              </a:solidFill>
+            </p:spPr>
+            <p:txBody>
+              <a:bodyPr wrap="square" rtlCol="0">
+                <a:spAutoFit/>
+              </a:bodyPr>
+              <a:lstStyle/>
+              <a:p>
+                <a:pPr>
+                  <a:lnSpc>
+                    <a:spcPct val="125000"/>
+                  </a:lnSpc>
+                </a:pPr>
+                <a:r>
+                  <a:rPr lang="en-GB" sz="3000" b="1" dirty="0">
+                    <a:solidFill>
+                      <a:schemeClr val="bg1"/>
+                    </a:solidFill>
+                    <a:latin typeface="Libre Baskerville" panose="02000000000000000000" pitchFamily="2" charset="0"/>
+                  </a:rPr>
+                  <a:t>Energy vs Time</a:t>
+                </a:r>
+              </a:p>
+            </p:txBody>
+          </p:sp>
+          <p:sp>
+            <p:nvSpPr>
+              <p:cNvPr id="50" name="TextBox 49">
+                <a:extLst>
+                  <a:ext uri="{FF2B5EF4-FFF2-40B4-BE49-F238E27FC236}">
+                    <a16:creationId xmlns:a16="http://schemas.microsoft.com/office/drawing/2014/main" id="{6DA80BBC-ACC8-4759-9FD8-E3E8CB8525E5}"/>
+                  </a:ext>
+                </a:extLst>
+              </p:cNvPr>
+              <p:cNvSpPr txBox="1"/>
+              <p:nvPr/>
+            </p:nvSpPr>
+            <p:spPr>
+              <a:xfrm>
+                <a:off x="453627" y="14105500"/>
+                <a:ext cx="5489972" cy="6248634"/>
+              </a:xfrm>
+              <a:prstGeom prst="rect">
+                <a:avLst/>
+              </a:prstGeom>
+              <a:noFill/>
+            </p:spPr>
+            <p:txBody>
+              <a:bodyPr wrap="square" rtlCol="0">
+                <a:spAutoFit/>
+              </a:bodyPr>
+              <a:lstStyle/>
+              <a:p>
+                <a:pPr marL="342900" indent="-342900">
+                  <a:lnSpc>
+                    <a:spcPct val="125000"/>
+                  </a:lnSpc>
+                  <a:buFont typeface="Arial" panose="020B0604020202020204" pitchFamily="34" charset="0"/>
+                  <a:buChar char="•"/>
+                </a:pPr>
+                <a:r>
+                  <a:rPr lang="en-GB" sz="2300" dirty="0">
+                    <a:latin typeface="Montserrat" panose="00000500000000000000" pitchFamily="2" charset="0"/>
+                  </a:rPr>
+                  <a:t>Energy vs Time relationship currently unknown in multi-threaded applications.</a:t>
+                </a:r>
+                <a:br>
+                  <a:rPr lang="en-GB" sz="2300" dirty="0">
+                    <a:latin typeface="Montserrat" panose="00000500000000000000" pitchFamily="2" charset="0"/>
+                  </a:rPr>
+                </a:br>
+                <a:endParaRPr lang="en-GB" sz="2300" dirty="0">
+                  <a:latin typeface="Montserrat" panose="00000500000000000000" pitchFamily="2" charset="0"/>
+                </a:endParaRPr>
+              </a:p>
+              <a:p>
+                <a:pPr marL="342900" indent="-342900">
+                  <a:lnSpc>
+                    <a:spcPct val="125000"/>
+                  </a:lnSpc>
+                  <a:buFont typeface="Arial" panose="020B0604020202020204" pitchFamily="34" charset="0"/>
+                  <a:buChar char="•"/>
+                </a:pPr>
+                <a:r>
+                  <a:rPr lang="en-GB" sz="2300" dirty="0">
+                    <a:latin typeface="Montserrat" panose="00000500000000000000" pitchFamily="2" charset="0"/>
+                  </a:rPr>
+                  <a:t>Previous work has shown strong linear correlation in single threaded applications [3].</a:t>
+                </a:r>
+                <a:br>
+                  <a:rPr lang="en-GB" sz="2300" dirty="0">
+                    <a:latin typeface="Montserrat" panose="00000500000000000000" pitchFamily="2" charset="0"/>
+                  </a:rPr>
+                </a:br>
+                <a:endParaRPr lang="en-GB" sz="2300" dirty="0">
+                  <a:latin typeface="Montserrat" panose="00000500000000000000" pitchFamily="2" charset="0"/>
+                </a:endParaRPr>
+              </a:p>
+              <a:p>
+                <a:pPr marL="342900" indent="-342900">
+                  <a:lnSpc>
+                    <a:spcPct val="125000"/>
+                  </a:lnSpc>
+                  <a:buFont typeface="Arial" panose="020B0604020202020204" pitchFamily="34" charset="0"/>
+                  <a:buChar char="•"/>
+                </a:pPr>
+                <a:r>
+                  <a:rPr lang="en-GB" sz="2300" dirty="0">
+                    <a:latin typeface="Montserrat" panose="00000500000000000000" pitchFamily="2" charset="0"/>
+                  </a:rPr>
+                  <a:t>Results of this project indicate</a:t>
+                </a:r>
+              </a:p>
+              <a:p>
+                <a:pPr marL="800100" lvl="1" indent="-342900">
+                  <a:lnSpc>
+                    <a:spcPct val="125000"/>
+                  </a:lnSpc>
+                  <a:buFont typeface="Arial" panose="020B0604020202020204" pitchFamily="34" charset="0"/>
+                  <a:buChar char="•"/>
+                </a:pPr>
+                <a:r>
+                  <a:rPr lang="en-GB" sz="2300" dirty="0">
+                    <a:latin typeface="Montserrat" panose="00000500000000000000" pitchFamily="2" charset="0"/>
+                  </a:rPr>
+                  <a:t>a linear correlation between energy and time</a:t>
+                </a:r>
+              </a:p>
+              <a:p>
+                <a:pPr marL="800100" lvl="1" indent="-342900">
+                  <a:lnSpc>
+                    <a:spcPct val="125000"/>
+                  </a:lnSpc>
+                  <a:buFont typeface="Arial" panose="020B0604020202020204" pitchFamily="34" charset="0"/>
+                  <a:buChar char="•"/>
+                </a:pPr>
+                <a:r>
+                  <a:rPr lang="en-GB" sz="2300" dirty="0">
+                    <a:latin typeface="Montserrat" panose="00000500000000000000" pitchFamily="2" charset="0"/>
+                  </a:rPr>
+                  <a:t>energy reduction not always equal to time reduction</a:t>
+                </a:r>
+                <a:br>
+                  <a:rPr lang="en-GB" sz="2300" dirty="0">
+                    <a:latin typeface="Montserrat" panose="00000500000000000000" pitchFamily="2" charset="0"/>
+                  </a:rPr>
+                </a:br>
+                <a:endParaRPr lang="en-GB" sz="2300" dirty="0">
+                  <a:latin typeface="Montserrat" panose="00000500000000000000" pitchFamily="2" charset="0"/>
+                </a:endParaRPr>
+              </a:p>
+            </p:txBody>
+          </p:sp>
+        </p:grpSp>
+        <p:pic>
+          <p:nvPicPr>
+            <p:cNvPr id="53" name="Picture 52">
+              <a:extLst>
+                <a:ext uri="{FF2B5EF4-FFF2-40B4-BE49-F238E27FC236}">
+                  <a16:creationId xmlns:a16="http://schemas.microsoft.com/office/drawing/2014/main" id="{E2A8304D-287D-4F45-9448-621431C2A435}"/>
+                </a:ext>
+              </a:extLst>
+            </p:cNvPr>
+            <p:cNvPicPr>
+              <a:picLocks noChangeAspect="1"/>
+            </p:cNvPicPr>
+            <p:nvPr/>
+          </p:nvPicPr>
+          <p:blipFill>
+            <a:blip r:embed="rId6">
+              <a:extLst>
+                <a:ext uri="{28A0092B-C50C-407E-A947-70E740481C1C}">
+                  <a14:useLocalDpi xmlns:a14="http://schemas.microsoft.com/office/drawing/2010/main" val="0"/>
+                </a:ext>
+              </a:extLst>
+            </a:blip>
+            <a:stretch>
+              <a:fillRect/>
+            </a:stretch>
+          </p:blipFill>
+          <p:spPr>
+            <a:xfrm>
+              <a:off x="8101743" y="22045862"/>
+              <a:ext cx="5485395" cy="3934254"/>
+            </a:xfrm>
+            <a:prstGeom prst="rect">
+              <a:avLst/>
+            </a:prstGeom>
+          </p:spPr>
+        </p:pic>
+      </p:grpSp>
       <p:pic>
         <p:nvPicPr>
-          <p:cNvPr id="23" name="Picture 22">
+          <p:cNvPr id="57" name="Picture 56">
             <a:extLst>
               <a:ext uri="{FF2B5EF4-FFF2-40B4-BE49-F238E27FC236}">
-                <a16:creationId xmlns:a16="http://schemas.microsoft.com/office/drawing/2014/main" id="{E3DF847B-848E-48C8-A730-5618981B47AD}"/>
+                <a16:creationId xmlns:a16="http://schemas.microsoft.com/office/drawing/2014/main" id="{BC8B877F-402B-4A57-AFEB-B297F40E0A1C}"/>
               </a:ext>
             </a:extLst>
           </p:cNvPr>
@@ -4216,7 +5076,7 @@
           <p:nvPr/>
         </p:nvPicPr>
         <p:blipFill>
-          <a:blip r:embed="rId2">
+          <a:blip r:embed="rId7">
             <a:extLst>
               <a:ext uri="{28A0092B-C50C-407E-A947-70E740481C1C}">
                 <a14:useLocalDpi xmlns:a14="http://schemas.microsoft.com/office/drawing/2010/main" val="0"/>
@@ -4229,8 +5089,8 @@
         </p:blipFill>
         <p:spPr>
           <a:xfrm>
-            <a:off x="76200" y="72199"/>
-            <a:ext cx="7048500" cy="2038350"/>
+            <a:off x="14845214" y="11183663"/>
+            <a:ext cx="5485395" cy="3765284"/>
           </a:xfrm>
           <a:prstGeom prst="rect">
             <a:avLst/>
@@ -4239,10 +5099,10 @@
       </p:pic>
       <p:grpSp>
         <p:nvGrpSpPr>
-          <p:cNvPr id="28" name="Group 27">
+          <p:cNvPr id="60" name="Group 59">
             <a:extLst>
               <a:ext uri="{FF2B5EF4-FFF2-40B4-BE49-F238E27FC236}">
-                <a16:creationId xmlns:a16="http://schemas.microsoft.com/office/drawing/2014/main" id="{27FC04AE-8502-494A-A8AB-F253B4B136EF}"/>
+                <a16:creationId xmlns:a16="http://schemas.microsoft.com/office/drawing/2014/main" id="{B797DFA0-5320-4A8C-9F64-0D7E66B2BB95}"/>
               </a:ext>
             </a:extLst>
           </p:cNvPr>
@@ -4251,142 +5111,314 @@
         </p:nvGrpSpPr>
         <p:grpSpPr>
           <a:xfrm>
-            <a:off x="7442597" y="8588484"/>
-            <a:ext cx="5489973" cy="4436512"/>
-            <a:chOff x="453627" y="13415270"/>
-            <a:chExt cx="5489973" cy="4436512"/>
+            <a:off x="14900029" y="15467556"/>
+            <a:ext cx="5490015" cy="11196469"/>
+            <a:chOff x="14900029" y="15010356"/>
+            <a:chExt cx="5490015" cy="11196469"/>
           </a:xfrm>
         </p:grpSpPr>
-        <p:sp>
-          <p:nvSpPr>
-            <p:cNvPr id="29" name="TextBox 28">
+        <p:grpSp>
+          <p:nvGrpSpPr>
+            <p:cNvPr id="24" name="Group 23">
               <a:extLst>
                 <a:ext uri="{FF2B5EF4-FFF2-40B4-BE49-F238E27FC236}">
-                  <a16:creationId xmlns:a16="http://schemas.microsoft.com/office/drawing/2014/main" id="{195C263C-A1CE-4AEC-9C36-E468FF55A0D2}"/>
+                  <a16:creationId xmlns:a16="http://schemas.microsoft.com/office/drawing/2014/main" id="{4B1CACF7-4515-49C7-A470-EA0E9E33F26E}"/>
                 </a:ext>
               </a:extLst>
             </p:cNvPr>
-            <p:cNvSpPr txBox="1"/>
+            <p:cNvGrpSpPr/>
             <p:nvPr/>
-          </p:nvSpPr>
+          </p:nvGrpSpPr>
+          <p:grpSpPr>
+            <a:xfrm>
+              <a:off x="14900029" y="15010356"/>
+              <a:ext cx="5490015" cy="6856696"/>
+              <a:chOff x="14538083" y="3502601"/>
+              <a:chExt cx="5490015" cy="6856696"/>
+            </a:xfrm>
+          </p:grpSpPr>
+          <p:sp>
+            <p:nvSpPr>
+              <p:cNvPr id="19" name="TextBox 18">
+                <a:extLst>
+                  <a:ext uri="{FF2B5EF4-FFF2-40B4-BE49-F238E27FC236}">
+                    <a16:creationId xmlns:a16="http://schemas.microsoft.com/office/drawing/2014/main" id="{6F42FF15-B0AA-4D29-9213-D91C2E19909C}"/>
+                  </a:ext>
+                </a:extLst>
+              </p:cNvPr>
+              <p:cNvSpPr txBox="1"/>
+              <p:nvPr/>
+            </p:nvSpPr>
+            <p:spPr>
+              <a:xfrm>
+                <a:off x="14538083" y="3502601"/>
+                <a:ext cx="5490000" cy="625684"/>
+              </a:xfrm>
+              <a:prstGeom prst="rect">
+                <a:avLst/>
+              </a:prstGeom>
+              <a:solidFill>
+                <a:srgbClr val="235078"/>
+              </a:solidFill>
+            </p:spPr>
+            <p:txBody>
+              <a:bodyPr wrap="square" rtlCol="0">
+                <a:spAutoFit/>
+              </a:bodyPr>
+              <a:lstStyle/>
+              <a:p>
+                <a:pPr>
+                  <a:lnSpc>
+                    <a:spcPct val="125000"/>
+                  </a:lnSpc>
+                </a:pPr>
+                <a:r>
+                  <a:rPr lang="en-GB" sz="3000" b="1" dirty="0">
+                    <a:solidFill>
+                      <a:schemeClr val="bg1"/>
+                    </a:solidFill>
+                    <a:latin typeface="Libre Baskerville" panose="02000000000000000000" pitchFamily="2" charset="0"/>
+                  </a:rPr>
+                  <a:t>Machine Learning</a:t>
+                </a:r>
+              </a:p>
+            </p:txBody>
+          </p:sp>
+          <p:sp>
+            <p:nvSpPr>
+              <p:cNvPr id="20" name="TextBox 19">
+                <a:extLst>
+                  <a:ext uri="{FF2B5EF4-FFF2-40B4-BE49-F238E27FC236}">
+                    <a16:creationId xmlns:a16="http://schemas.microsoft.com/office/drawing/2014/main" id="{E3624357-620E-4395-A722-CFCCD05ACA7A}"/>
+                  </a:ext>
+                </a:extLst>
+              </p:cNvPr>
+              <p:cNvSpPr txBox="1"/>
+              <p:nvPr/>
+            </p:nvSpPr>
+            <p:spPr>
+              <a:xfrm>
+                <a:off x="14538126" y="4110663"/>
+                <a:ext cx="5489972" cy="6248634"/>
+              </a:xfrm>
+              <a:prstGeom prst="rect">
+                <a:avLst/>
+              </a:prstGeom>
+              <a:noFill/>
+            </p:spPr>
+            <p:txBody>
+              <a:bodyPr wrap="square" rtlCol="0">
+                <a:spAutoFit/>
+              </a:bodyPr>
+              <a:lstStyle/>
+              <a:p>
+                <a:pPr marL="342900" indent="-342900">
+                  <a:lnSpc>
+                    <a:spcPct val="125000"/>
+                  </a:lnSpc>
+                  <a:buFont typeface="Arial" panose="020B0604020202020204" pitchFamily="34" charset="0"/>
+                  <a:buChar char="•"/>
+                </a:pPr>
+                <a:r>
+                  <a:rPr lang="en-GB" sz="2300" dirty="0">
+                    <a:latin typeface="Montserrat" panose="00000500000000000000" pitchFamily="2" charset="0"/>
+                  </a:rPr>
+                  <a:t>Use the </a:t>
+                </a:r>
+                <a:r>
+                  <a:rPr lang="en-GB" sz="2300" b="1" dirty="0">
+                    <a:latin typeface="Montserrat" panose="00000500000000000000" pitchFamily="2" charset="0"/>
+                  </a:rPr>
+                  <a:t>1-Nearest-Neigbour</a:t>
+                </a:r>
+                <a:r>
+                  <a:rPr lang="en-GB" sz="2300" dirty="0">
+                    <a:latin typeface="Montserrat" panose="00000500000000000000" pitchFamily="2" charset="0"/>
+                  </a:rPr>
+                  <a:t> (1NN) technique to </a:t>
+                </a:r>
+                <a:r>
+                  <a:rPr lang="en-GB" sz="2300" b="1" dirty="0">
+                    <a:latin typeface="Montserrat" panose="00000500000000000000" pitchFamily="2" charset="0"/>
+                  </a:rPr>
+                  <a:t>predict</a:t>
+                </a:r>
+                <a:r>
+                  <a:rPr lang="en-GB" sz="2300" dirty="0">
+                    <a:latin typeface="Montserrat" panose="00000500000000000000" pitchFamily="2" charset="0"/>
+                  </a:rPr>
+                  <a:t> good compiler configurations.</a:t>
+                </a:r>
+                <a:br>
+                  <a:rPr lang="en-GB" sz="2300" dirty="0">
+                    <a:latin typeface="Montserrat" panose="00000500000000000000" pitchFamily="2" charset="0"/>
+                  </a:rPr>
+                </a:br>
+                <a:endParaRPr lang="en-GB" sz="2300" dirty="0">
+                  <a:latin typeface="Montserrat" panose="00000500000000000000" pitchFamily="2" charset="0"/>
+                </a:endParaRPr>
+              </a:p>
+              <a:p>
+                <a:pPr marL="342900" indent="-342900">
+                  <a:lnSpc>
+                    <a:spcPct val="125000"/>
+                  </a:lnSpc>
+                  <a:buFont typeface="Arial" panose="020B0604020202020204" pitchFamily="34" charset="0"/>
+                  <a:buChar char="•"/>
+                </a:pPr>
+                <a:r>
+                  <a:rPr lang="en-GB" sz="2300" dirty="0">
+                    <a:latin typeface="Montserrat" panose="00000500000000000000" pitchFamily="2" charset="0"/>
+                  </a:rPr>
+                  <a:t>Use 65 features identified in Milepost study [1] extracted from source code.</a:t>
+                </a:r>
+                <a:br>
+                  <a:rPr lang="en-GB" sz="2300" dirty="0">
+                    <a:latin typeface="Montserrat" panose="00000500000000000000" pitchFamily="2" charset="0"/>
+                  </a:rPr>
+                </a:br>
+                <a:endParaRPr lang="en-GB" sz="2300" dirty="0">
+                  <a:latin typeface="Montserrat" panose="00000500000000000000" pitchFamily="2" charset="0"/>
+                </a:endParaRPr>
+              </a:p>
+              <a:p>
+                <a:pPr marL="342900" indent="-342900">
+                  <a:lnSpc>
+                    <a:spcPct val="125000"/>
+                  </a:lnSpc>
+                  <a:buFont typeface="Arial" panose="020B0604020202020204" pitchFamily="34" charset="0"/>
+                  <a:buChar char="•"/>
+                </a:pPr>
+                <a:r>
+                  <a:rPr lang="en-GB" sz="2300" dirty="0">
+                    <a:latin typeface="Montserrat" panose="00000500000000000000" pitchFamily="2" charset="0"/>
+                  </a:rPr>
+                  <a:t>Explore a new feature using the </a:t>
+                </a:r>
+                <a:r>
+                  <a:rPr lang="en-GB" sz="2300" b="1" dirty="0">
+                    <a:latin typeface="Montserrat" panose="00000500000000000000" pitchFamily="2" charset="0"/>
+                  </a:rPr>
+                  <a:t>Seven Dwarfs </a:t>
+                </a:r>
+                <a:r>
+                  <a:rPr lang="en-GB" sz="2300" dirty="0">
+                    <a:latin typeface="Montserrat" panose="00000500000000000000" pitchFamily="2" charset="0"/>
+                  </a:rPr>
+                  <a:t>classification system [4].</a:t>
+                </a:r>
+                <a:br>
+                  <a:rPr lang="en-GB" sz="2300" dirty="0">
+                    <a:latin typeface="Montserrat" panose="00000500000000000000" pitchFamily="2" charset="0"/>
+                  </a:rPr>
+                </a:br>
+                <a:endParaRPr lang="en-GB" sz="2300" dirty="0">
+                  <a:latin typeface="Montserrat" panose="00000500000000000000" pitchFamily="2" charset="0"/>
+                </a:endParaRPr>
+              </a:p>
+              <a:p>
+                <a:pPr marL="342900" indent="-342900">
+                  <a:lnSpc>
+                    <a:spcPct val="125000"/>
+                  </a:lnSpc>
+                  <a:buFont typeface="Arial" panose="020B0604020202020204" pitchFamily="34" charset="0"/>
+                  <a:buChar char="•"/>
+                </a:pPr>
+                <a:r>
+                  <a:rPr lang="en-GB" sz="2300" dirty="0">
+                    <a:latin typeface="Montserrat" panose="00000500000000000000" pitchFamily="2" charset="0"/>
+                  </a:rPr>
+                  <a:t>Benchmarks analysed for </a:t>
+                </a:r>
+                <a:r>
+                  <a:rPr lang="en-GB" sz="2300" b="1" dirty="0">
+                    <a:latin typeface="Montserrat" panose="00000500000000000000" pitchFamily="2" charset="0"/>
+                  </a:rPr>
+                  <a:t>suitability</a:t>
+                </a:r>
+                <a:r>
+                  <a:rPr lang="en-GB" sz="2300" dirty="0">
+                    <a:latin typeface="Montserrat" panose="00000500000000000000" pitchFamily="2" charset="0"/>
+                  </a:rPr>
+                  <a:t> to use in 1-NN:</a:t>
+                </a:r>
+              </a:p>
+            </p:txBody>
+          </p:sp>
+        </p:grpSp>
+        <p:pic>
+          <p:nvPicPr>
+            <p:cNvPr id="59" name="Picture 58">
+              <a:extLst>
+                <a:ext uri="{FF2B5EF4-FFF2-40B4-BE49-F238E27FC236}">
+                  <a16:creationId xmlns:a16="http://schemas.microsoft.com/office/drawing/2014/main" id="{4627F5F0-559F-4119-8E7A-44E027E40A2D}"/>
+                </a:ext>
+              </a:extLst>
+            </p:cNvPr>
+            <p:cNvPicPr>
+              <a:picLocks noChangeAspect="1"/>
+            </p:cNvPicPr>
+            <p:nvPr/>
+          </p:nvPicPr>
+          <p:blipFill>
+            <a:blip r:embed="rId8">
+              <a:extLst>
+                <a:ext uri="{28A0092B-C50C-407E-A947-70E740481C1C}">
+                  <a14:useLocalDpi xmlns:a14="http://schemas.microsoft.com/office/drawing/2010/main" val="0"/>
+                </a:ext>
+              </a:extLst>
+            </a:blip>
+            <a:stretch>
+              <a:fillRect/>
+            </a:stretch>
+          </p:blipFill>
           <p:spPr>
             <a:xfrm>
-              <a:off x="453628" y="13415270"/>
-              <a:ext cx="5489972" cy="625684"/>
+              <a:off x="14900029" y="22044540"/>
+              <a:ext cx="5485395" cy="4162285"/>
             </a:xfrm>
             <a:prstGeom prst="rect">
               <a:avLst/>
             </a:prstGeom>
-            <a:solidFill>
-              <a:srgbClr val="235078"/>
-            </a:solidFill>
           </p:spPr>
-          <p:txBody>
-            <a:bodyPr wrap="square" rtlCol="0">
-              <a:spAutoFit/>
-            </a:bodyPr>
-            <a:lstStyle/>
-            <a:p>
-              <a:pPr>
-                <a:lnSpc>
-                  <a:spcPct val="125000"/>
-                </a:lnSpc>
-              </a:pPr>
-              <a:r>
-                <a:rPr lang="en-GB" sz="3000" b="1" dirty="0">
-                  <a:solidFill>
-                    <a:schemeClr val="bg1"/>
-                  </a:solidFill>
-                  <a:latin typeface="Libre Baskerville" panose="02000000000000000000" pitchFamily="2" charset="0"/>
-                </a:rPr>
-                <a:t>Benchmark Programs</a:t>
-              </a:r>
-            </a:p>
-          </p:txBody>
-        </p:sp>
-        <p:sp>
-          <p:nvSpPr>
-            <p:cNvPr id="30" name="TextBox 29">
-              <a:extLst>
-                <a:ext uri="{FF2B5EF4-FFF2-40B4-BE49-F238E27FC236}">
-                  <a16:creationId xmlns:a16="http://schemas.microsoft.com/office/drawing/2014/main" id="{1947FD71-3340-4327-9298-DC2CE48B48EE}"/>
-                </a:ext>
-              </a:extLst>
-            </p:cNvPr>
-            <p:cNvSpPr txBox="1"/>
-            <p:nvPr/>
-          </p:nvSpPr>
-          <p:spPr>
-            <a:xfrm>
-              <a:off x="453627" y="14105500"/>
-              <a:ext cx="5489972" cy="3746282"/>
-            </a:xfrm>
-            <a:prstGeom prst="rect">
-              <a:avLst/>
-            </a:prstGeom>
-            <a:noFill/>
-          </p:spPr>
-          <p:txBody>
-            <a:bodyPr wrap="square" rtlCol="0">
-              <a:spAutoFit/>
-            </a:bodyPr>
-            <a:lstStyle/>
-            <a:p>
-              <a:pPr marL="342900" indent="-342900">
-                <a:lnSpc>
-                  <a:spcPct val="125000"/>
-                </a:lnSpc>
-                <a:buFont typeface="Arial" panose="020B0604020202020204" pitchFamily="34" charset="0"/>
-                <a:buChar char="•"/>
-              </a:pPr>
-              <a:r>
-                <a:rPr lang="en-GB" sz="2400" dirty="0">
-                  <a:latin typeface="Montserrat" panose="00000500000000000000" pitchFamily="2" charset="0"/>
-                </a:rPr>
-                <a:t>Energy measurements are available through the Intel Running Average Power Limit (</a:t>
-              </a:r>
-              <a:r>
-                <a:rPr lang="en-GB" sz="2400" b="1" dirty="0">
-                  <a:latin typeface="Montserrat" panose="00000500000000000000" pitchFamily="2" charset="0"/>
-                </a:rPr>
-                <a:t>RAPL</a:t>
-              </a:r>
-              <a:r>
-                <a:rPr lang="en-GB" sz="2400" dirty="0">
-                  <a:latin typeface="Montserrat" panose="00000500000000000000" pitchFamily="2" charset="0"/>
-                </a:rPr>
-                <a:t>)  feature.</a:t>
-              </a:r>
-              <a:br>
-                <a:rPr lang="en-GB" sz="2400" dirty="0">
-                  <a:latin typeface="Montserrat" panose="00000500000000000000" pitchFamily="2" charset="0"/>
-                </a:rPr>
-              </a:br>
-              <a:endParaRPr lang="en-GB" sz="2400" dirty="0">
-                <a:latin typeface="Montserrat" panose="00000500000000000000" pitchFamily="2" charset="0"/>
-              </a:endParaRPr>
-            </a:p>
-            <a:p>
-              <a:pPr marL="342900" indent="-342900">
-                <a:lnSpc>
-                  <a:spcPct val="125000"/>
-                </a:lnSpc>
-                <a:buFont typeface="Arial" panose="020B0604020202020204" pitchFamily="34" charset="0"/>
-                <a:buChar char="•"/>
-              </a:pPr>
-              <a:r>
-                <a:rPr lang="en-GB" sz="2400" dirty="0">
-                  <a:latin typeface="Montserrat" panose="00000500000000000000" pitchFamily="2" charset="0"/>
-                </a:rPr>
-                <a:t>A C program has been written to measure energy consumption through RAPL</a:t>
-              </a:r>
-              <a:endParaRPr lang="en-GB" sz="2200" dirty="0">
-                <a:latin typeface="Montserrat" panose="00000500000000000000" pitchFamily="2" charset="0"/>
-              </a:endParaRPr>
-            </a:p>
-          </p:txBody>
-        </p:sp>
+        </p:pic>
       </p:grpSp>
+      <p:pic>
+        <p:nvPicPr>
+          <p:cNvPr id="66" name="Picture 65">
+            <a:extLst>
+              <a:ext uri="{FF2B5EF4-FFF2-40B4-BE49-F238E27FC236}">
+                <a16:creationId xmlns:a16="http://schemas.microsoft.com/office/drawing/2014/main" id="{1D883EF1-C965-449E-80DF-ED24D5D4966C}"/>
+              </a:ext>
+            </a:extLst>
+          </p:cNvPr>
+          <p:cNvPicPr>
+            <a:picLocks noChangeAspect="1"/>
+          </p:cNvPicPr>
+          <p:nvPr/>
+        </p:nvPicPr>
+        <p:blipFill>
+          <a:blip r:embed="rId9">
+            <a:extLst>
+              <a:ext uri="{28A0092B-C50C-407E-A947-70E740481C1C}">
+                <a14:useLocalDpi xmlns:a14="http://schemas.microsoft.com/office/drawing/2010/main" val="0"/>
+              </a:ext>
+            </a:extLst>
+          </a:blip>
+          <a:stretch>
+            <a:fillRect/>
+          </a:stretch>
+        </p:blipFill>
+        <p:spPr>
+          <a:xfrm>
+            <a:off x="1105678" y="22501659"/>
+            <a:ext cx="5485396" cy="4131674"/>
+          </a:xfrm>
+          <a:prstGeom prst="rect">
+            <a:avLst/>
+          </a:prstGeom>
+        </p:spPr>
+      </p:pic>
     </p:spTree>
     <p:extLst>
       <p:ext uri="{BB962C8B-B14F-4D97-AF65-F5344CB8AC3E}">
@@ -4659,4 +5691,299 @@
     </a:ext>
   </a:extLst>
 </a:theme>
+</file>
+
+<file path=ppt/theme/theme2.xml><?xml version="1.0" encoding="utf-8"?>
+<a:theme xmlns:a="http://schemas.openxmlformats.org/drawingml/2006/main" name="Office Theme">
+  <a:themeElements>
+    <a:clrScheme name="Office">
+      <a:dk1>
+        <a:sysClr val="windowText" lastClr="000000"/>
+      </a:dk1>
+      <a:lt1>
+        <a:sysClr val="window" lastClr="FFFFFF"/>
+      </a:lt1>
+      <a:dk2>
+        <a:srgbClr val="44546A"/>
+      </a:dk2>
+      <a:lt2>
+        <a:srgbClr val="E7E6E6"/>
+      </a:lt2>
+      <a:accent1>
+        <a:srgbClr val="4472C4"/>
+      </a:accent1>
+      <a:accent2>
+        <a:srgbClr val="ED7D31"/>
+      </a:accent2>
+      <a:accent3>
+        <a:srgbClr val="A5A5A5"/>
+      </a:accent3>
+      <a:accent4>
+        <a:srgbClr val="FFC000"/>
+      </a:accent4>
+      <a:accent5>
+        <a:srgbClr val="5B9BD5"/>
+      </a:accent5>
+      <a:accent6>
+        <a:srgbClr val="70AD47"/>
+      </a:accent6>
+      <a:hlink>
+        <a:srgbClr val="0563C1"/>
+      </a:hlink>
+      <a:folHlink>
+        <a:srgbClr val="954F72"/>
+      </a:folHlink>
+    </a:clrScheme>
+    <a:fontScheme name="Office">
+      <a:majorFont>
+        <a:latin typeface="Calibri Light" panose="020F0302020204030204"/>
+        <a:ea typeface=""/>
+        <a:cs typeface=""/>
+        <a:font script="Jpan" typeface="游ゴシック Light"/>
+        <a:font script="Hang" typeface="맑은 고딕"/>
+        <a:font script="Hans" typeface="等线 Light"/>
+        <a:font script="Hant" typeface="新細明體"/>
+        <a:font script="Arab" typeface="Times New Roman"/>
+        <a:font script="Hebr" typeface="Times New Roman"/>
+        <a:font script="Thai" typeface="Angsana New"/>
+        <a:font script="Ethi" typeface="Nyala"/>
+        <a:font script="Beng" typeface="Vrinda"/>
+        <a:font script="Gujr" typeface="Shruti"/>
+        <a:font script="Khmr" typeface="MoolBoran"/>
+        <a:font script="Knda" typeface="Tunga"/>
+        <a:font script="Guru" typeface="Raavi"/>
+        <a:font script="Cans" typeface="Euphemia"/>
+        <a:font script="Cher" typeface="Plantagenet Cherokee"/>
+        <a:font script="Yiii" typeface="Microsoft Yi Baiti"/>
+        <a:font script="Tibt" typeface="Microsoft Himalaya"/>
+        <a:font script="Thaa" typeface="MV Boli"/>
+        <a:font script="Deva" typeface="Mangal"/>
+        <a:font script="Telu" typeface="Gautami"/>
+        <a:font script="Taml" typeface="Latha"/>
+        <a:font script="Syrc" typeface="Estrangelo Edessa"/>
+        <a:font script="Orya" typeface="Kalinga"/>
+        <a:font script="Mlym" typeface="Kartika"/>
+        <a:font script="Laoo" typeface="DokChampa"/>
+        <a:font script="Sinh" typeface="Iskoola Pota"/>
+        <a:font script="Mong" typeface="Mongolian Baiti"/>
+        <a:font script="Viet" typeface="Times New Roman"/>
+        <a:font script="Uigh" typeface="Microsoft Uighur"/>
+        <a:font script="Geor" typeface="Sylfaen"/>
+        <a:font script="Armn" typeface="Arial"/>
+        <a:font script="Bugi" typeface="Leelawadee UI"/>
+        <a:font script="Bopo" typeface="Microsoft JhengHei"/>
+        <a:font script="Java" typeface="Javanese Text"/>
+        <a:font script="Lisu" typeface="Segoe UI"/>
+        <a:font script="Mymr" typeface="Myanmar Text"/>
+        <a:font script="Nkoo" typeface="Ebrima"/>
+        <a:font script="Olck" typeface="Nirmala UI"/>
+        <a:font script="Osma" typeface="Ebrima"/>
+        <a:font script="Phag" typeface="Phagspa"/>
+        <a:font script="Syrn" typeface="Estrangelo Edessa"/>
+        <a:font script="Syrj" typeface="Estrangelo Edessa"/>
+        <a:font script="Syre" typeface="Estrangelo Edessa"/>
+        <a:font script="Sora" typeface="Nirmala UI"/>
+        <a:font script="Tale" typeface="Microsoft Tai Le"/>
+        <a:font script="Talu" typeface="Microsoft New Tai Lue"/>
+        <a:font script="Tfng" typeface="Ebrima"/>
+      </a:majorFont>
+      <a:minorFont>
+        <a:latin typeface="Calibri" panose="020F0502020204030204"/>
+        <a:ea typeface=""/>
+        <a:cs typeface=""/>
+        <a:font script="Jpan" typeface="游ゴシック"/>
+        <a:font script="Hang" typeface="맑은 고딕"/>
+        <a:font script="Hans" typeface="等线"/>
+        <a:font script="Hant" typeface="新細明體"/>
+        <a:font script="Arab" typeface="Arial"/>
+        <a:font script="Hebr" typeface="Arial"/>
+        <a:font script="Thai" typeface="Cordia New"/>
+        <a:font script="Ethi" typeface="Nyala"/>
+        <a:font script="Beng" typeface="Vrinda"/>
+        <a:font script="Gujr" typeface="Shruti"/>
+        <a:font script="Khmr" typeface="DaunPenh"/>
+        <a:font script="Knda" typeface="Tunga"/>
+        <a:font script="Guru" typeface="Raavi"/>
+        <a:font script="Cans" typeface="Euphemia"/>
+        <a:font script="Cher" typeface="Plantagenet Cherokee"/>
+        <a:font script="Yiii" typeface="Microsoft Yi Baiti"/>
+        <a:font script="Tibt" typeface="Microsoft Himalaya"/>
+        <a:font script="Thaa" typeface="MV Boli"/>
+        <a:font script="Deva" typeface="Mangal"/>
+        <a:font script="Telu" typeface="Gautami"/>
+        <a:font script="Taml" typeface="Latha"/>
+        <a:font script="Syrc" typeface="Estrangelo Edessa"/>
+        <a:font script="Orya" typeface="Kalinga"/>
+        <a:font script="Mlym" typeface="Kartika"/>
+        <a:font script="Laoo" typeface="DokChampa"/>
+        <a:font script="Sinh" typeface="Iskoola Pota"/>
+        <a:font script="Mong" typeface="Mongolian Baiti"/>
+        <a:font script="Viet" typeface="Arial"/>
+        <a:font script="Uigh" typeface="Microsoft Uighur"/>
+        <a:font script="Geor" typeface="Sylfaen"/>
+        <a:font script="Armn" typeface="Arial"/>
+        <a:font script="Bugi" typeface="Leelawadee UI"/>
+        <a:font script="Bopo" typeface="Microsoft JhengHei"/>
+        <a:font script="Java" typeface="Javanese Text"/>
+        <a:font script="Lisu" typeface="Segoe UI"/>
+        <a:font script="Mymr" typeface="Myanmar Text"/>
+        <a:font script="Nkoo" typeface="Ebrima"/>
+        <a:font script="Olck" typeface="Nirmala UI"/>
+        <a:font script="Osma" typeface="Ebrima"/>
+        <a:font script="Phag" typeface="Phagspa"/>
+        <a:font script="Syrn" typeface="Estrangelo Edessa"/>
+        <a:font script="Syrj" typeface="Estrangelo Edessa"/>
+        <a:font script="Syre" typeface="Estrangelo Edessa"/>
+        <a:font script="Sora" typeface="Nirmala UI"/>
+        <a:font script="Tale" typeface="Microsoft Tai Le"/>
+        <a:font script="Talu" typeface="Microsoft New Tai Lue"/>
+        <a:font script="Tfng" typeface="Ebrima"/>
+      </a:minorFont>
+    </a:fontScheme>
+    <a:fmtScheme name="Office">
+      <a:fillStyleLst>
+        <a:solidFill>
+          <a:schemeClr val="phClr"/>
+        </a:solidFill>
+        <a:gradFill rotWithShape="1">
+          <a:gsLst>
+            <a:gs pos="0">
+              <a:schemeClr val="phClr">
+                <a:lumMod val="110000"/>
+                <a:satMod val="105000"/>
+                <a:tint val="67000"/>
+              </a:schemeClr>
+            </a:gs>
+            <a:gs pos="50000">
+              <a:schemeClr val="phClr">
+                <a:lumMod val="105000"/>
+                <a:satMod val="103000"/>
+                <a:tint val="73000"/>
+              </a:schemeClr>
+            </a:gs>
+            <a:gs pos="100000">
+              <a:schemeClr val="phClr">
+                <a:lumMod val="105000"/>
+                <a:satMod val="109000"/>
+                <a:tint val="81000"/>
+              </a:schemeClr>
+            </a:gs>
+          </a:gsLst>
+          <a:lin ang="5400000" scaled="0"/>
+        </a:gradFill>
+        <a:gradFill rotWithShape="1">
+          <a:gsLst>
+            <a:gs pos="0">
+              <a:schemeClr val="phClr">
+                <a:satMod val="103000"/>
+                <a:lumMod val="102000"/>
+                <a:tint val="94000"/>
+              </a:schemeClr>
+            </a:gs>
+            <a:gs pos="50000">
+              <a:schemeClr val="phClr">
+                <a:satMod val="110000"/>
+                <a:lumMod val="100000"/>
+                <a:shade val="100000"/>
+              </a:schemeClr>
+            </a:gs>
+            <a:gs pos="100000">
+              <a:schemeClr val="phClr">
+                <a:lumMod val="99000"/>
+                <a:satMod val="120000"/>
+                <a:shade val="78000"/>
+              </a:schemeClr>
+            </a:gs>
+          </a:gsLst>
+          <a:lin ang="5400000" scaled="0"/>
+        </a:gradFill>
+      </a:fillStyleLst>
+      <a:lnStyleLst>
+        <a:ln w="6350" cap="flat" cmpd="sng" algn="ctr">
+          <a:solidFill>
+            <a:schemeClr val="phClr"/>
+          </a:solidFill>
+          <a:prstDash val="solid"/>
+          <a:miter lim="800000"/>
+        </a:ln>
+        <a:ln w="12700" cap="flat" cmpd="sng" algn="ctr">
+          <a:solidFill>
+            <a:schemeClr val="phClr"/>
+          </a:solidFill>
+          <a:prstDash val="solid"/>
+          <a:miter lim="800000"/>
+        </a:ln>
+        <a:ln w="19050" cap="flat" cmpd="sng" algn="ctr">
+          <a:solidFill>
+            <a:schemeClr val="phClr"/>
+          </a:solidFill>
+          <a:prstDash val="solid"/>
+          <a:miter lim="800000"/>
+        </a:ln>
+      </a:lnStyleLst>
+      <a:effectStyleLst>
+        <a:effectStyle>
+          <a:effectLst/>
+        </a:effectStyle>
+        <a:effectStyle>
+          <a:effectLst/>
+        </a:effectStyle>
+        <a:effectStyle>
+          <a:effectLst>
+            <a:outerShdw blurRad="57150" dist="19050" dir="5400000" algn="ctr" rotWithShape="0">
+              <a:srgbClr val="000000">
+                <a:alpha val="63000"/>
+              </a:srgbClr>
+            </a:outerShdw>
+          </a:effectLst>
+        </a:effectStyle>
+      </a:effectStyleLst>
+      <a:bgFillStyleLst>
+        <a:solidFill>
+          <a:schemeClr val="phClr"/>
+        </a:solidFill>
+        <a:solidFill>
+          <a:schemeClr val="phClr">
+            <a:tint val="95000"/>
+            <a:satMod val="170000"/>
+          </a:schemeClr>
+        </a:solidFill>
+        <a:gradFill rotWithShape="1">
+          <a:gsLst>
+            <a:gs pos="0">
+              <a:schemeClr val="phClr">
+                <a:tint val="93000"/>
+                <a:satMod val="150000"/>
+                <a:shade val="98000"/>
+                <a:lumMod val="102000"/>
+              </a:schemeClr>
+            </a:gs>
+            <a:gs pos="50000">
+              <a:schemeClr val="phClr">
+                <a:tint val="98000"/>
+                <a:satMod val="130000"/>
+                <a:shade val="90000"/>
+                <a:lumMod val="103000"/>
+              </a:schemeClr>
+            </a:gs>
+            <a:gs pos="100000">
+              <a:schemeClr val="phClr">
+                <a:shade val="63000"/>
+                <a:satMod val="120000"/>
+              </a:schemeClr>
+            </a:gs>
+          </a:gsLst>
+          <a:lin ang="5400000" scaled="0"/>
+        </a:gradFill>
+      </a:bgFillStyleLst>
+    </a:fmtScheme>
+  </a:themeElements>
+  <a:objectDefaults/>
+  <a:extraClrSchemeLst/>
+  <a:extLst>
+    <a:ext uri="{05A4C25C-085E-4340-85A3-A5531E510DB2}">
+      <thm15:themeFamily xmlns:thm15="http://schemas.microsoft.com/office/thememl/2012/main" name="Office Theme" id="{62F939B6-93AF-4DB8-9C6B-D6C7DFDC589F}" vid="{4A3C46E8-61CC-4603-A589-7422A47A8E4A}"/>
+    </a:ext>
+  </a:extLst>
+</a:theme>
 </file>
</xml_diff>

<commit_message>
Added some results comparing node energy variation
</commit_message>
<xml_diff>
--- a/poster/poster.pptx
+++ b/poster/poster.pptx
@@ -197,7 +197,7 @@
           <a:p>
             <a:fld id="{3BC1AFD8-657F-48F7-A693-8E7AF2433BCD}" type="datetimeFigureOut">
               <a:rPr lang="en-GB" smtClean="0"/>
-              <a:t>10/08/2018</a:t>
+              <a:t>14/08/2018</a:t>
             </a:fld>
             <a:endParaRPr lang="en-GB"/>
           </a:p>
@@ -596,7 +596,7 @@
           <a:p>
             <a:fld id="{61CC7E6D-2778-4985-A783-70A96C97D3A0}" type="datetimeFigureOut">
               <a:rPr lang="en-GB" smtClean="0"/>
-              <a:t>10/08/2018</a:t>
+              <a:t>14/08/2018</a:t>
             </a:fld>
             <a:endParaRPr lang="en-GB"/>
           </a:p>
@@ -766,7 +766,7 @@
           <a:p>
             <a:fld id="{61CC7E6D-2778-4985-A783-70A96C97D3A0}" type="datetimeFigureOut">
               <a:rPr lang="en-GB" smtClean="0"/>
-              <a:t>10/08/2018</a:t>
+              <a:t>14/08/2018</a:t>
             </a:fld>
             <a:endParaRPr lang="en-GB"/>
           </a:p>
@@ -946,7 +946,7 @@
           <a:p>
             <a:fld id="{61CC7E6D-2778-4985-A783-70A96C97D3A0}" type="datetimeFigureOut">
               <a:rPr lang="en-GB" smtClean="0"/>
-              <a:t>10/08/2018</a:t>
+              <a:t>14/08/2018</a:t>
             </a:fld>
             <a:endParaRPr lang="en-GB"/>
           </a:p>
@@ -1116,7 +1116,7 @@
           <a:p>
             <a:fld id="{61CC7E6D-2778-4985-A783-70A96C97D3A0}" type="datetimeFigureOut">
               <a:rPr lang="en-GB" smtClean="0"/>
-              <a:t>10/08/2018</a:t>
+              <a:t>14/08/2018</a:t>
             </a:fld>
             <a:endParaRPr lang="en-GB"/>
           </a:p>
@@ -1360,7 +1360,7 @@
           <a:p>
             <a:fld id="{61CC7E6D-2778-4985-A783-70A96C97D3A0}" type="datetimeFigureOut">
               <a:rPr lang="en-GB" smtClean="0"/>
-              <a:t>10/08/2018</a:t>
+              <a:t>14/08/2018</a:t>
             </a:fld>
             <a:endParaRPr lang="en-GB"/>
           </a:p>
@@ -1592,7 +1592,7 @@
           <a:p>
             <a:fld id="{61CC7E6D-2778-4985-A783-70A96C97D3A0}" type="datetimeFigureOut">
               <a:rPr lang="en-GB" smtClean="0"/>
-              <a:t>10/08/2018</a:t>
+              <a:t>14/08/2018</a:t>
             </a:fld>
             <a:endParaRPr lang="en-GB"/>
           </a:p>
@@ -1959,7 +1959,7 @@
           <a:p>
             <a:fld id="{61CC7E6D-2778-4985-A783-70A96C97D3A0}" type="datetimeFigureOut">
               <a:rPr lang="en-GB" smtClean="0"/>
-              <a:t>10/08/2018</a:t>
+              <a:t>14/08/2018</a:t>
             </a:fld>
             <a:endParaRPr lang="en-GB"/>
           </a:p>
@@ -2077,7 +2077,7 @@
           <a:p>
             <a:fld id="{61CC7E6D-2778-4985-A783-70A96C97D3A0}" type="datetimeFigureOut">
               <a:rPr lang="en-GB" smtClean="0"/>
-              <a:t>10/08/2018</a:t>
+              <a:t>14/08/2018</a:t>
             </a:fld>
             <a:endParaRPr lang="en-GB"/>
           </a:p>
@@ -2172,7 +2172,7 @@
           <a:p>
             <a:fld id="{61CC7E6D-2778-4985-A783-70A96C97D3A0}" type="datetimeFigureOut">
               <a:rPr lang="en-GB" smtClean="0"/>
-              <a:t>10/08/2018</a:t>
+              <a:t>14/08/2018</a:t>
             </a:fld>
             <a:endParaRPr lang="en-GB"/>
           </a:p>
@@ -2449,7 +2449,7 @@
           <a:p>
             <a:fld id="{61CC7E6D-2778-4985-A783-70A96C97D3A0}" type="datetimeFigureOut">
               <a:rPr lang="en-GB" smtClean="0"/>
-              <a:t>10/08/2018</a:t>
+              <a:t>14/08/2018</a:t>
             </a:fld>
             <a:endParaRPr lang="en-GB"/>
           </a:p>
@@ -2706,7 +2706,7 @@
           <a:p>
             <a:fld id="{61CC7E6D-2778-4985-A783-70A96C97D3A0}" type="datetimeFigureOut">
               <a:rPr lang="en-GB" smtClean="0"/>
-              <a:t>10/08/2018</a:t>
+              <a:t>14/08/2018</a:t>
             </a:fld>
             <a:endParaRPr lang="en-GB"/>
           </a:p>
@@ -2919,7 +2919,7 @@
           <a:p>
             <a:fld id="{61CC7E6D-2778-4985-A783-70A96C97D3A0}" type="datetimeFigureOut">
               <a:rPr lang="en-GB" smtClean="0"/>
-              <a:t>10/08/2018</a:t>
+              <a:t>14/08/2018</a:t>
             </a:fld>
             <a:endParaRPr lang="en-GB"/>
           </a:p>
@@ -4128,209 +4128,6 @@
       </p:grpSp>
       <p:grpSp>
         <p:nvGrpSpPr>
-          <p:cNvPr id="25" name="Group 24">
-            <a:extLst>
-              <a:ext uri="{FF2B5EF4-FFF2-40B4-BE49-F238E27FC236}">
-                <a16:creationId xmlns:a16="http://schemas.microsoft.com/office/drawing/2014/main" id="{88CC0E79-038E-4111-8473-BAA7F58DFD07}"/>
-              </a:ext>
-            </a:extLst>
-          </p:cNvPr>
-          <p:cNvGrpSpPr/>
-          <p:nvPr/>
-        </p:nvGrpSpPr>
-        <p:grpSpPr>
-          <a:xfrm>
-            <a:off x="14900044" y="3431593"/>
-            <a:ext cx="5490000" cy="7781583"/>
-            <a:chOff x="7562850" y="3478820"/>
-            <a:chExt cx="5490000" cy="7781583"/>
-          </a:xfrm>
-        </p:grpSpPr>
-        <p:sp>
-          <p:nvSpPr>
-            <p:cNvPr id="14" name="TextBox 13">
-              <a:extLst>
-                <a:ext uri="{FF2B5EF4-FFF2-40B4-BE49-F238E27FC236}">
-                  <a16:creationId xmlns:a16="http://schemas.microsoft.com/office/drawing/2014/main" id="{1FC576B2-FD9E-4A70-BC1C-BEA8703142CD}"/>
-                </a:ext>
-              </a:extLst>
-            </p:cNvPr>
-            <p:cNvSpPr txBox="1"/>
-            <p:nvPr/>
-          </p:nvSpPr>
-          <p:spPr>
-            <a:xfrm>
-              <a:off x="7562850" y="3478820"/>
-              <a:ext cx="5490000" cy="625684"/>
-            </a:xfrm>
-            <a:prstGeom prst="rect">
-              <a:avLst/>
-            </a:prstGeom>
-            <a:solidFill>
-              <a:srgbClr val="235078"/>
-            </a:solidFill>
-          </p:spPr>
-          <p:txBody>
-            <a:bodyPr wrap="square" rtlCol="0">
-              <a:spAutoFit/>
-            </a:bodyPr>
-            <a:lstStyle/>
-            <a:p>
-              <a:pPr>
-                <a:lnSpc>
-                  <a:spcPct val="125000"/>
-                </a:lnSpc>
-              </a:pPr>
-              <a:r>
-                <a:rPr lang="en-GB" sz="3000" b="1" dirty="0">
-                  <a:solidFill>
-                    <a:schemeClr val="bg1"/>
-                  </a:solidFill>
-                  <a:latin typeface="Libre Baskerville" panose="02000000000000000000" pitchFamily="2" charset="0"/>
-                </a:rPr>
-                <a:t>Iterative Compilation</a:t>
-              </a:r>
-            </a:p>
-          </p:txBody>
-        </p:sp>
-        <p:sp>
-          <p:nvSpPr>
-            <p:cNvPr id="16" name="TextBox 15">
-              <a:extLst>
-                <a:ext uri="{FF2B5EF4-FFF2-40B4-BE49-F238E27FC236}">
-                  <a16:creationId xmlns:a16="http://schemas.microsoft.com/office/drawing/2014/main" id="{120FE71E-E20A-4B87-A0A2-86801D9AF337}"/>
-                </a:ext>
-              </a:extLst>
-            </p:cNvPr>
-            <p:cNvSpPr txBox="1"/>
-            <p:nvPr/>
-          </p:nvSpPr>
-          <p:spPr>
-            <a:xfrm>
-              <a:off x="7562850" y="4126912"/>
-              <a:ext cx="5489972" cy="7133491"/>
-            </a:xfrm>
-            <a:prstGeom prst="rect">
-              <a:avLst/>
-            </a:prstGeom>
-            <a:noFill/>
-          </p:spPr>
-          <p:txBody>
-            <a:bodyPr wrap="square" rtlCol="0">
-              <a:spAutoFit/>
-            </a:bodyPr>
-            <a:lstStyle/>
-            <a:p>
-              <a:pPr marL="342900" indent="-342900">
-                <a:lnSpc>
-                  <a:spcPct val="125000"/>
-                </a:lnSpc>
-                <a:buFont typeface="Arial" panose="020B0604020202020204" pitchFamily="34" charset="0"/>
-                <a:buChar char="•"/>
-              </a:pPr>
-              <a:r>
-                <a:rPr lang="en-GB" sz="2300" dirty="0">
-                  <a:latin typeface="Montserrat" panose="00000500000000000000" pitchFamily="2" charset="0"/>
-                </a:rPr>
-                <a:t>Iterative compilation algorithm </a:t>
-              </a:r>
-              <a:r>
-                <a:rPr lang="en-GB" sz="2300" b="1" dirty="0">
-                  <a:latin typeface="Montserrat" panose="00000500000000000000" pitchFamily="2" charset="0"/>
-                </a:rPr>
-                <a:t>Combined Elimination</a:t>
-              </a:r>
-              <a:r>
-                <a:rPr lang="en-GB" sz="2300" dirty="0">
-                  <a:latin typeface="Montserrat" panose="00000500000000000000" pitchFamily="2" charset="0"/>
-                </a:rPr>
-                <a:t> [2] used to search compiler optimisation space.</a:t>
-              </a:r>
-              <a:br>
-                <a:rPr lang="en-GB" sz="2300" dirty="0">
-                  <a:latin typeface="Montserrat" panose="00000500000000000000" pitchFamily="2" charset="0"/>
-                </a:rPr>
-              </a:br>
-              <a:endParaRPr lang="en-GB" sz="2300" dirty="0">
-                <a:latin typeface="Montserrat" panose="00000500000000000000" pitchFamily="2" charset="0"/>
-              </a:endParaRPr>
-            </a:p>
-            <a:p>
-              <a:pPr marL="342900" indent="-342900">
-                <a:lnSpc>
-                  <a:spcPct val="125000"/>
-                </a:lnSpc>
-                <a:buFont typeface="Arial" panose="020B0604020202020204" pitchFamily="34" charset="0"/>
-                <a:buChar char="•"/>
-              </a:pPr>
-              <a:r>
-                <a:rPr lang="en-GB" sz="2300" dirty="0">
-                  <a:latin typeface="Montserrat" panose="00000500000000000000" pitchFamily="2" charset="0"/>
-                </a:rPr>
-                <a:t>Space is very large (195 optimisations in GCC 7.2). Cannot exhaustively search.</a:t>
-              </a:r>
-              <a:br>
-                <a:rPr lang="en-GB" sz="2300" dirty="0">
-                  <a:latin typeface="Montserrat" panose="00000500000000000000" pitchFamily="2" charset="0"/>
-                </a:rPr>
-              </a:br>
-              <a:endParaRPr lang="en-GB" sz="2300" dirty="0">
-                <a:latin typeface="Montserrat" panose="00000500000000000000" pitchFamily="2" charset="0"/>
-              </a:endParaRPr>
-            </a:p>
-            <a:p>
-              <a:pPr marL="342900" indent="-342900">
-                <a:lnSpc>
-                  <a:spcPct val="125000"/>
-                </a:lnSpc>
-                <a:buFont typeface="Arial" panose="020B0604020202020204" pitchFamily="34" charset="0"/>
-                <a:buChar char="•"/>
-              </a:pPr>
-              <a:r>
-                <a:rPr lang="en-GB" sz="2300" dirty="0">
-                  <a:latin typeface="Montserrat" panose="00000500000000000000" pitchFamily="2" charset="0"/>
-                </a:rPr>
-                <a:t>Explores the how compiler optimisations affect energy and time.</a:t>
-              </a:r>
-              <a:br>
-                <a:rPr lang="en-GB" sz="2300" dirty="0">
-                  <a:latin typeface="Montserrat" panose="00000500000000000000" pitchFamily="2" charset="0"/>
-                </a:rPr>
-              </a:br>
-              <a:endParaRPr lang="en-GB" sz="2300" dirty="0">
-                <a:latin typeface="Montserrat" panose="00000500000000000000" pitchFamily="2" charset="0"/>
-              </a:endParaRPr>
-            </a:p>
-            <a:p>
-              <a:pPr marL="342900" indent="-342900">
-                <a:lnSpc>
-                  <a:spcPct val="125000"/>
-                </a:lnSpc>
-                <a:buFont typeface="Arial" panose="020B0604020202020204" pitchFamily="34" charset="0"/>
-                <a:buChar char="•"/>
-              </a:pPr>
-              <a:r>
-                <a:rPr lang="en-GB" sz="2300" dirty="0">
-                  <a:latin typeface="Montserrat" panose="00000500000000000000" pitchFamily="2" charset="0"/>
-                </a:rPr>
-                <a:t>Provides training data for machine learning techniques.</a:t>
-              </a:r>
-            </a:p>
-            <a:p>
-              <a:pPr>
-                <a:lnSpc>
-                  <a:spcPct val="125000"/>
-                </a:lnSpc>
-              </a:pPr>
-              <a:endParaRPr lang="en-GB" sz="2300" dirty="0">
-                <a:latin typeface="Montserrat" panose="00000500000000000000" pitchFamily="2" charset="0"/>
-              </a:endParaRPr>
-            </a:p>
-          </p:txBody>
-        </p:sp>
-      </p:grpSp>
-      <p:grpSp>
-        <p:nvGrpSpPr>
           <p:cNvPr id="44" name="Group 43">
             <a:extLst>
               <a:ext uri="{FF2B5EF4-FFF2-40B4-BE49-F238E27FC236}">
@@ -4343,12 +4140,48 @@
         </p:nvGrpSpPr>
         <p:grpSpPr>
           <a:xfrm>
-            <a:off x="8101742" y="3431593"/>
-            <a:ext cx="5489973" cy="11499801"/>
-            <a:chOff x="7442597" y="8588484"/>
-            <a:chExt cx="5489973" cy="11499801"/>
+            <a:off x="14818750" y="3430986"/>
+            <a:ext cx="5571252" cy="11567317"/>
+            <a:chOff x="7361318" y="8588484"/>
+            <a:chExt cx="5571252" cy="11567317"/>
           </a:xfrm>
         </p:grpSpPr>
+        <p:pic>
+          <p:nvPicPr>
+            <p:cNvPr id="43" name="Picture 42">
+              <a:extLst>
+                <a:ext uri="{FF2B5EF4-FFF2-40B4-BE49-F238E27FC236}">
+                  <a16:creationId xmlns:a16="http://schemas.microsoft.com/office/drawing/2014/main" id="{A8312505-1087-4628-8C08-E2D676CB74C1}"/>
+                </a:ext>
+              </a:extLst>
+            </p:cNvPr>
+            <p:cNvPicPr>
+              <a:picLocks noChangeAspect="1"/>
+            </p:cNvPicPr>
+            <p:nvPr/>
+          </p:nvPicPr>
+          <p:blipFill>
+            <a:blip r:embed="rId4">
+              <a:extLst>
+                <a:ext uri="{28A0092B-C50C-407E-A947-70E740481C1C}">
+                  <a14:useLocalDpi xmlns:a14="http://schemas.microsoft.com/office/drawing/2010/main" val="0"/>
+                </a:ext>
+              </a:extLst>
+            </a:blip>
+            <a:stretch>
+              <a:fillRect/>
+            </a:stretch>
+          </p:blipFill>
+          <p:spPr>
+            <a:xfrm>
+              <a:off x="7447174" y="12431198"/>
+              <a:ext cx="5485395" cy="3802843"/>
+            </a:xfrm>
+            <a:prstGeom prst="rect">
+              <a:avLst/>
+            </a:prstGeom>
+          </p:spPr>
+        </p:pic>
         <p:grpSp>
           <p:nvGrpSpPr>
             <p:cNvPr id="28" name="Group 27">
@@ -4545,42 +4378,6 @@
             <p:nvPr/>
           </p:nvPicPr>
           <p:blipFill>
-            <a:blip r:embed="rId4">
-              <a:extLst>
-                <a:ext uri="{28A0092B-C50C-407E-A947-70E740481C1C}">
-                  <a14:useLocalDpi xmlns:a14="http://schemas.microsoft.com/office/drawing/2010/main" val="0"/>
-                </a:ext>
-              </a:extLst>
-            </a:blip>
-            <a:stretch>
-              <a:fillRect/>
-            </a:stretch>
-          </p:blipFill>
-          <p:spPr>
-            <a:xfrm>
-              <a:off x="7442598" y="16319860"/>
-              <a:ext cx="5489971" cy="3768425"/>
-            </a:xfrm>
-            <a:prstGeom prst="rect">
-              <a:avLst/>
-            </a:prstGeom>
-          </p:spPr>
-        </p:pic>
-        <p:pic>
-          <p:nvPicPr>
-            <p:cNvPr id="43" name="Picture 42">
-              <a:extLst>
-                <a:ext uri="{FF2B5EF4-FFF2-40B4-BE49-F238E27FC236}">
-                  <a16:creationId xmlns:a16="http://schemas.microsoft.com/office/drawing/2014/main" id="{A8312505-1087-4628-8C08-E2D676CB74C1}"/>
-                </a:ext>
-              </a:extLst>
-            </p:cNvPr>
-            <p:cNvPicPr>
-              <a:picLocks noChangeAspect="1"/>
-            </p:cNvPicPr>
-            <p:nvPr/>
-          </p:nvPicPr>
-          <p:blipFill>
             <a:blip r:embed="rId5">
               <a:extLst>
                 <a:ext uri="{28A0092B-C50C-407E-A947-70E740481C1C}">
@@ -4594,219 +4391,14 @@
           </p:blipFill>
           <p:spPr>
             <a:xfrm>
-              <a:off x="7447174" y="12534217"/>
-              <a:ext cx="5485395" cy="3802843"/>
+              <a:off x="7361318" y="16366459"/>
+              <a:ext cx="5520444" cy="3789342"/>
             </a:xfrm>
             <a:prstGeom prst="rect">
               <a:avLst/>
             </a:prstGeom>
           </p:spPr>
         </p:pic>
-      </p:grpSp>
-      <p:grpSp>
-        <p:nvGrpSpPr>
-          <p:cNvPr id="62" name="Group 61">
-            <a:extLst>
-              <a:ext uri="{FF2B5EF4-FFF2-40B4-BE49-F238E27FC236}">
-                <a16:creationId xmlns:a16="http://schemas.microsoft.com/office/drawing/2014/main" id="{451C2698-8797-4AD7-BC4C-1C45E575DB09}"/>
-              </a:ext>
-            </a:extLst>
-          </p:cNvPr>
-          <p:cNvGrpSpPr/>
-          <p:nvPr/>
-        </p:nvGrpSpPr>
-        <p:grpSpPr>
-          <a:xfrm>
-            <a:off x="1105678" y="15473800"/>
-            <a:ext cx="5489973" cy="6970420"/>
-            <a:chOff x="1105677" y="15010356"/>
-            <a:chExt cx="5489973" cy="6970420"/>
-          </a:xfrm>
-        </p:grpSpPr>
-        <p:sp>
-          <p:nvSpPr>
-            <p:cNvPr id="15" name="TextBox 14">
-              <a:extLst>
-                <a:ext uri="{FF2B5EF4-FFF2-40B4-BE49-F238E27FC236}">
-                  <a16:creationId xmlns:a16="http://schemas.microsoft.com/office/drawing/2014/main" id="{36583889-AC97-4BEC-AC3F-F44E37930580}"/>
-                </a:ext>
-              </a:extLst>
-            </p:cNvPr>
-            <p:cNvSpPr txBox="1"/>
-            <p:nvPr/>
-          </p:nvSpPr>
-          <p:spPr>
-            <a:xfrm>
-              <a:off x="1105678" y="15732142"/>
-              <a:ext cx="5489972" cy="6248634"/>
-            </a:xfrm>
-            <a:prstGeom prst="rect">
-              <a:avLst/>
-            </a:prstGeom>
-            <a:noFill/>
-          </p:spPr>
-          <p:txBody>
-            <a:bodyPr wrap="square" rtlCol="0">
-              <a:spAutoFit/>
-            </a:bodyPr>
-            <a:lstStyle/>
-            <a:p>
-              <a:pPr marL="342900" indent="-342900">
-                <a:lnSpc>
-                  <a:spcPct val="125000"/>
-                </a:lnSpc>
-                <a:buFont typeface="Arial" panose="020B0604020202020204" pitchFamily="34" charset="0"/>
-                <a:buChar char="•"/>
-              </a:pPr>
-              <a:r>
-                <a:rPr lang="en-GB" sz="2300" dirty="0">
-                  <a:latin typeface="Montserrat" panose="00000500000000000000" pitchFamily="2" charset="0"/>
-                </a:rPr>
-                <a:t>Energy measurements available through the Intel Running Average Power Limit (</a:t>
-              </a:r>
-              <a:r>
-                <a:rPr lang="en-GB" sz="2300" b="1" dirty="0">
-                  <a:latin typeface="Montserrat" panose="00000500000000000000" pitchFamily="2" charset="0"/>
-                </a:rPr>
-                <a:t>RAPL</a:t>
-              </a:r>
-              <a:r>
-                <a:rPr lang="en-GB" sz="2300" dirty="0">
-                  <a:latin typeface="Montserrat" panose="00000500000000000000" pitchFamily="2" charset="0"/>
-                </a:rPr>
-                <a:t>)  feature.</a:t>
-              </a:r>
-              <a:br>
-                <a:rPr lang="en-GB" sz="2300" dirty="0">
-                  <a:latin typeface="Montserrat" panose="00000500000000000000" pitchFamily="2" charset="0"/>
-                </a:rPr>
-              </a:br>
-              <a:endParaRPr lang="en-GB" sz="2300" dirty="0">
-                <a:latin typeface="Montserrat" panose="00000500000000000000" pitchFamily="2" charset="0"/>
-              </a:endParaRPr>
-            </a:p>
-            <a:p>
-              <a:pPr marL="342900" indent="-342900">
-                <a:lnSpc>
-                  <a:spcPct val="125000"/>
-                </a:lnSpc>
-                <a:buFont typeface="Arial" panose="020B0604020202020204" pitchFamily="34" charset="0"/>
-                <a:buChar char="•"/>
-              </a:pPr>
-              <a:r>
-                <a:rPr lang="en-GB" sz="2300" dirty="0">
-                  <a:latin typeface="Montserrat" panose="00000500000000000000" pitchFamily="2" charset="0"/>
-                </a:rPr>
-                <a:t>Measures processor package and DRAM energy consumption.</a:t>
-              </a:r>
-              <a:br>
-                <a:rPr lang="en-GB" sz="2300" dirty="0">
-                  <a:latin typeface="Montserrat" panose="00000500000000000000" pitchFamily="2" charset="0"/>
-                </a:rPr>
-              </a:br>
-              <a:endParaRPr lang="en-GB" sz="2300" dirty="0">
-                <a:latin typeface="Montserrat" panose="00000500000000000000" pitchFamily="2" charset="0"/>
-              </a:endParaRPr>
-            </a:p>
-            <a:p>
-              <a:pPr marL="342900" indent="-342900">
-                <a:lnSpc>
-                  <a:spcPct val="125000"/>
-                </a:lnSpc>
-                <a:buFont typeface="Arial" panose="020B0604020202020204" pitchFamily="34" charset="0"/>
-                <a:buChar char="•"/>
-              </a:pPr>
-              <a:r>
-                <a:rPr lang="en-GB" sz="2300" dirty="0">
-                  <a:latin typeface="Montserrat" panose="00000500000000000000" pitchFamily="2" charset="0"/>
-                </a:rPr>
-                <a:t>Energy monitoring tool written in C.</a:t>
-              </a:r>
-              <a:br>
-                <a:rPr lang="en-GB" sz="2300" dirty="0">
-                  <a:latin typeface="Montserrat" panose="00000500000000000000" pitchFamily="2" charset="0"/>
-                </a:rPr>
-              </a:br>
-              <a:endParaRPr lang="en-GB" sz="2300" dirty="0">
-                <a:latin typeface="Montserrat" panose="00000500000000000000" pitchFamily="2" charset="0"/>
-              </a:endParaRPr>
-            </a:p>
-            <a:p>
-              <a:pPr marL="342900" indent="-342900">
-                <a:lnSpc>
-                  <a:spcPct val="125000"/>
-                </a:lnSpc>
-                <a:buFont typeface="Arial" panose="020B0604020202020204" pitchFamily="34" charset="0"/>
-                <a:buChar char="•"/>
-              </a:pPr>
-              <a:r>
-                <a:rPr lang="en-GB" sz="2300" dirty="0">
-                  <a:latin typeface="Montserrat" panose="00000500000000000000" pitchFamily="2" charset="0"/>
-                </a:rPr>
-                <a:t>Multiple versions of monitoring tool developed and tested for </a:t>
-              </a:r>
-              <a:r>
-                <a:rPr lang="en-GB" sz="2300" b="1" dirty="0">
-                  <a:latin typeface="Montserrat" panose="00000500000000000000" pitchFamily="2" charset="0"/>
-                </a:rPr>
-                <a:t>stability</a:t>
-              </a:r>
-              <a:r>
-                <a:rPr lang="en-GB" sz="2300" dirty="0">
-                  <a:latin typeface="Montserrat" panose="00000500000000000000" pitchFamily="2" charset="0"/>
-                </a:rPr>
-                <a:t>:</a:t>
-              </a:r>
-            </a:p>
-          </p:txBody>
-        </p:sp>
-        <p:sp>
-          <p:nvSpPr>
-            <p:cNvPr id="51" name="TextBox 50">
-              <a:extLst>
-                <a:ext uri="{FF2B5EF4-FFF2-40B4-BE49-F238E27FC236}">
-                  <a16:creationId xmlns:a16="http://schemas.microsoft.com/office/drawing/2014/main" id="{EFAD6EDA-81D5-42A1-B56C-0ED7E7C7735A}"/>
-                </a:ext>
-              </a:extLst>
-            </p:cNvPr>
-            <p:cNvSpPr txBox="1"/>
-            <p:nvPr/>
-          </p:nvSpPr>
-          <p:spPr>
-            <a:xfrm>
-              <a:off x="1105677" y="15010356"/>
-              <a:ext cx="5485396" cy="625684"/>
-            </a:xfrm>
-            <a:prstGeom prst="rect">
-              <a:avLst/>
-            </a:prstGeom>
-            <a:solidFill>
-              <a:srgbClr val="235078"/>
-            </a:solidFill>
-          </p:spPr>
-          <p:txBody>
-            <a:bodyPr wrap="square" rtlCol="0">
-              <a:spAutoFit/>
-            </a:bodyPr>
-            <a:lstStyle/>
-            <a:p>
-              <a:pPr>
-                <a:lnSpc>
-                  <a:spcPct val="125000"/>
-                </a:lnSpc>
-              </a:pPr>
-              <a:r>
-                <a:rPr lang="en-GB" sz="3000" b="1" dirty="0">
-                  <a:solidFill>
-                    <a:schemeClr val="bg1"/>
-                  </a:solidFill>
-                  <a:latin typeface="Libre Baskerville" panose="02000000000000000000" pitchFamily="2" charset="0"/>
-                </a:rPr>
-                <a:t>Energy Measurements</a:t>
-              </a:r>
-            </a:p>
-          </p:txBody>
-        </p:sp>
       </p:grpSp>
       <p:grpSp>
         <p:nvGrpSpPr>
@@ -4822,10 +4414,10 @@
         </p:nvGrpSpPr>
         <p:grpSpPr>
           <a:xfrm>
-            <a:off x="8101742" y="15466548"/>
-            <a:ext cx="5489972" cy="10969446"/>
+            <a:off x="8097165" y="15133230"/>
+            <a:ext cx="5489972" cy="11201850"/>
             <a:chOff x="8101742" y="15010670"/>
-            <a:chExt cx="5489972" cy="10969446"/>
+            <a:chExt cx="5489972" cy="11201850"/>
           </a:xfrm>
         </p:grpSpPr>
         <p:grpSp>
@@ -5052,8 +4644,8 @@
           </p:blipFill>
           <p:spPr>
             <a:xfrm>
-              <a:off x="8101743" y="22045862"/>
-              <a:ext cx="5485395" cy="3934254"/>
+              <a:off x="8101742" y="22446428"/>
+              <a:ext cx="5250932" cy="3766092"/>
             </a:xfrm>
             <a:prstGeom prst="rect">
               <a:avLst/>
@@ -5061,42 +4653,266 @@
           </p:spPr>
         </p:pic>
       </p:grpSp>
-      <p:pic>
-        <p:nvPicPr>
-          <p:cNvPr id="57" name="Picture 56">
+      <p:grpSp>
+        <p:nvGrpSpPr>
+          <p:cNvPr id="6" name="Group 5">
             <a:extLst>
               <a:ext uri="{FF2B5EF4-FFF2-40B4-BE49-F238E27FC236}">
-                <a16:creationId xmlns:a16="http://schemas.microsoft.com/office/drawing/2014/main" id="{BC8B877F-402B-4A57-AFEB-B297F40E0A1C}"/>
+                <a16:creationId xmlns:a16="http://schemas.microsoft.com/office/drawing/2014/main" id="{D4B0C96D-F18D-40C0-9031-4E2DF15BAF32}"/>
               </a:ext>
             </a:extLst>
           </p:cNvPr>
-          <p:cNvPicPr>
-            <a:picLocks noChangeAspect="1"/>
-          </p:cNvPicPr>
+          <p:cNvGrpSpPr/>
           <p:nvPr/>
-        </p:nvPicPr>
-        <p:blipFill>
-          <a:blip r:embed="rId7">
-            <a:extLst>
-              <a:ext uri="{28A0092B-C50C-407E-A947-70E740481C1C}">
-                <a14:useLocalDpi xmlns:a14="http://schemas.microsoft.com/office/drawing/2010/main" val="0"/>
-              </a:ext>
-            </a:extLst>
-          </a:blip>
-          <a:stretch>
-            <a:fillRect/>
-          </a:stretch>
-        </p:blipFill>
-        <p:spPr>
+        </p:nvGrpSpPr>
+        <p:grpSpPr>
           <a:xfrm>
-            <a:off x="14845214" y="11183663"/>
-            <a:ext cx="5485395" cy="3765284"/>
+            <a:off x="1105678" y="15128009"/>
+            <a:ext cx="5485409" cy="11437473"/>
+            <a:chOff x="14845201" y="3431593"/>
+            <a:chExt cx="5583347" cy="11437473"/>
           </a:xfrm>
-          <a:prstGeom prst="rect">
-            <a:avLst/>
-          </a:prstGeom>
-        </p:spPr>
-      </p:pic>
+        </p:grpSpPr>
+        <p:grpSp>
+          <p:nvGrpSpPr>
+            <p:cNvPr id="25" name="Group 24">
+              <a:extLst>
+                <a:ext uri="{FF2B5EF4-FFF2-40B4-BE49-F238E27FC236}">
+                  <a16:creationId xmlns:a16="http://schemas.microsoft.com/office/drawing/2014/main" id="{88CC0E79-038E-4111-8473-BAA7F58DFD07}"/>
+                </a:ext>
+              </a:extLst>
+            </p:cNvPr>
+            <p:cNvGrpSpPr/>
+            <p:nvPr/>
+          </p:nvGrpSpPr>
+          <p:grpSpPr>
+            <a:xfrm>
+              <a:off x="14900043" y="3431593"/>
+              <a:ext cx="5528505" cy="7781583"/>
+              <a:chOff x="7562849" y="3478820"/>
+              <a:chExt cx="5528505" cy="7781583"/>
+            </a:xfrm>
+          </p:grpSpPr>
+          <p:sp>
+            <p:nvSpPr>
+              <p:cNvPr id="14" name="TextBox 13">
+                <a:extLst>
+                  <a:ext uri="{FF2B5EF4-FFF2-40B4-BE49-F238E27FC236}">
+                    <a16:creationId xmlns:a16="http://schemas.microsoft.com/office/drawing/2014/main" id="{1FC576B2-FD9E-4A70-BC1C-BEA8703142CD}"/>
+                  </a:ext>
+                </a:extLst>
+              </p:cNvPr>
+              <p:cNvSpPr txBox="1"/>
+              <p:nvPr/>
+            </p:nvSpPr>
+            <p:spPr>
+              <a:xfrm>
+                <a:off x="7562849" y="3478820"/>
+                <a:ext cx="5528505" cy="625684"/>
+              </a:xfrm>
+              <a:prstGeom prst="rect">
+                <a:avLst/>
+              </a:prstGeom>
+              <a:solidFill>
+                <a:srgbClr val="235078"/>
+              </a:solidFill>
+            </p:spPr>
+            <p:txBody>
+              <a:bodyPr wrap="square" rtlCol="0">
+                <a:spAutoFit/>
+              </a:bodyPr>
+              <a:lstStyle/>
+              <a:p>
+                <a:pPr>
+                  <a:lnSpc>
+                    <a:spcPct val="125000"/>
+                  </a:lnSpc>
+                </a:pPr>
+                <a:r>
+                  <a:rPr lang="en-GB" sz="3000" b="1" dirty="0">
+                    <a:solidFill>
+                      <a:schemeClr val="bg1"/>
+                    </a:solidFill>
+                    <a:latin typeface="Libre Baskerville" panose="02000000000000000000" pitchFamily="2" charset="0"/>
+                  </a:rPr>
+                  <a:t>Iterative Compilation</a:t>
+                </a:r>
+              </a:p>
+            </p:txBody>
+          </p:sp>
+          <p:sp>
+            <p:nvSpPr>
+              <p:cNvPr id="16" name="TextBox 15">
+                <a:extLst>
+                  <a:ext uri="{FF2B5EF4-FFF2-40B4-BE49-F238E27FC236}">
+                    <a16:creationId xmlns:a16="http://schemas.microsoft.com/office/drawing/2014/main" id="{120FE71E-E20A-4B87-A0A2-86801D9AF337}"/>
+                  </a:ext>
+                </a:extLst>
+              </p:cNvPr>
+              <p:cNvSpPr txBox="1"/>
+              <p:nvPr/>
+            </p:nvSpPr>
+            <p:spPr>
+              <a:xfrm>
+                <a:off x="7562850" y="4126912"/>
+                <a:ext cx="5489972" cy="7133491"/>
+              </a:xfrm>
+              <a:prstGeom prst="rect">
+                <a:avLst/>
+              </a:prstGeom>
+              <a:noFill/>
+            </p:spPr>
+            <p:txBody>
+              <a:bodyPr wrap="square" rtlCol="0">
+                <a:spAutoFit/>
+              </a:bodyPr>
+              <a:lstStyle/>
+              <a:p>
+                <a:pPr marL="342900" indent="-342900">
+                  <a:lnSpc>
+                    <a:spcPct val="125000"/>
+                  </a:lnSpc>
+                  <a:buFont typeface="Arial" panose="020B0604020202020204" pitchFamily="34" charset="0"/>
+                  <a:buChar char="•"/>
+                </a:pPr>
+                <a:r>
+                  <a:rPr lang="en-GB" sz="2300" dirty="0">
+                    <a:latin typeface="Montserrat" panose="00000500000000000000" pitchFamily="2" charset="0"/>
+                  </a:rPr>
+                  <a:t>Iterative compilation algorithm </a:t>
+                </a:r>
+                <a:r>
+                  <a:rPr lang="en-GB" sz="2300" b="1" dirty="0">
+                    <a:latin typeface="Montserrat" panose="00000500000000000000" pitchFamily="2" charset="0"/>
+                  </a:rPr>
+                  <a:t>Combined Elimination</a:t>
+                </a:r>
+                <a:r>
+                  <a:rPr lang="en-GB" sz="2300" dirty="0">
+                    <a:latin typeface="Montserrat" panose="00000500000000000000" pitchFamily="2" charset="0"/>
+                  </a:rPr>
+                  <a:t> [2] used to search compiler optimisation space.</a:t>
+                </a:r>
+                <a:br>
+                  <a:rPr lang="en-GB" sz="2300" dirty="0">
+                    <a:latin typeface="Montserrat" panose="00000500000000000000" pitchFamily="2" charset="0"/>
+                  </a:rPr>
+                </a:br>
+                <a:endParaRPr lang="en-GB" sz="2300" dirty="0">
+                  <a:latin typeface="Montserrat" panose="00000500000000000000" pitchFamily="2" charset="0"/>
+                </a:endParaRPr>
+              </a:p>
+              <a:p>
+                <a:pPr marL="342900" indent="-342900">
+                  <a:lnSpc>
+                    <a:spcPct val="125000"/>
+                  </a:lnSpc>
+                  <a:buFont typeface="Arial" panose="020B0604020202020204" pitchFamily="34" charset="0"/>
+                  <a:buChar char="•"/>
+                </a:pPr>
+                <a:r>
+                  <a:rPr lang="en-GB" sz="2300" dirty="0">
+                    <a:latin typeface="Montserrat" panose="00000500000000000000" pitchFamily="2" charset="0"/>
+                  </a:rPr>
+                  <a:t>Space is very large (195 optimisations in GCC 7.2). Cannot exhaustively search.</a:t>
+                </a:r>
+                <a:br>
+                  <a:rPr lang="en-GB" sz="2300" dirty="0">
+                    <a:latin typeface="Montserrat" panose="00000500000000000000" pitchFamily="2" charset="0"/>
+                  </a:rPr>
+                </a:br>
+                <a:endParaRPr lang="en-GB" sz="2300" dirty="0">
+                  <a:latin typeface="Montserrat" panose="00000500000000000000" pitchFamily="2" charset="0"/>
+                </a:endParaRPr>
+              </a:p>
+              <a:p>
+                <a:pPr marL="342900" indent="-342900">
+                  <a:lnSpc>
+                    <a:spcPct val="125000"/>
+                  </a:lnSpc>
+                  <a:buFont typeface="Arial" panose="020B0604020202020204" pitchFamily="34" charset="0"/>
+                  <a:buChar char="•"/>
+                </a:pPr>
+                <a:r>
+                  <a:rPr lang="en-GB" sz="2300" dirty="0">
+                    <a:latin typeface="Montserrat" panose="00000500000000000000" pitchFamily="2" charset="0"/>
+                  </a:rPr>
+                  <a:t>Explores the how compiler optimisations affect energy and time.</a:t>
+                </a:r>
+                <a:br>
+                  <a:rPr lang="en-GB" sz="2300" dirty="0">
+                    <a:latin typeface="Montserrat" panose="00000500000000000000" pitchFamily="2" charset="0"/>
+                  </a:rPr>
+                </a:br>
+                <a:endParaRPr lang="en-GB" sz="2300" dirty="0">
+                  <a:latin typeface="Montserrat" panose="00000500000000000000" pitchFamily="2" charset="0"/>
+                </a:endParaRPr>
+              </a:p>
+              <a:p>
+                <a:pPr marL="342900" indent="-342900">
+                  <a:lnSpc>
+                    <a:spcPct val="125000"/>
+                  </a:lnSpc>
+                  <a:buFont typeface="Arial" panose="020B0604020202020204" pitchFamily="34" charset="0"/>
+                  <a:buChar char="•"/>
+                </a:pPr>
+                <a:r>
+                  <a:rPr lang="en-GB" sz="2300" dirty="0">
+                    <a:latin typeface="Montserrat" panose="00000500000000000000" pitchFamily="2" charset="0"/>
+                  </a:rPr>
+                  <a:t>Provides training data for machine learning techniques.</a:t>
+                </a:r>
+              </a:p>
+              <a:p>
+                <a:pPr>
+                  <a:lnSpc>
+                    <a:spcPct val="125000"/>
+                  </a:lnSpc>
+                </a:pPr>
+                <a:endParaRPr lang="en-GB" sz="2300" dirty="0">
+                  <a:latin typeface="Montserrat" panose="00000500000000000000" pitchFamily="2" charset="0"/>
+                </a:endParaRPr>
+              </a:p>
+            </p:txBody>
+          </p:sp>
+        </p:grpSp>
+        <p:pic>
+          <p:nvPicPr>
+            <p:cNvPr id="57" name="Picture 56">
+              <a:extLst>
+                <a:ext uri="{FF2B5EF4-FFF2-40B4-BE49-F238E27FC236}">
+                  <a16:creationId xmlns:a16="http://schemas.microsoft.com/office/drawing/2014/main" id="{BC8B877F-402B-4A57-AFEB-B297F40E0A1C}"/>
+                </a:ext>
+              </a:extLst>
+            </p:cNvPr>
+            <p:cNvPicPr>
+              <a:picLocks noChangeAspect="1"/>
+            </p:cNvPicPr>
+            <p:nvPr/>
+          </p:nvPicPr>
+          <p:blipFill>
+            <a:blip r:embed="rId7">
+              <a:extLst>
+                <a:ext uri="{28A0092B-C50C-407E-A947-70E740481C1C}">
+                  <a14:useLocalDpi xmlns:a14="http://schemas.microsoft.com/office/drawing/2010/main" val="0"/>
+                </a:ext>
+              </a:extLst>
+            </a:blip>
+            <a:stretch>
+              <a:fillRect/>
+            </a:stretch>
+          </p:blipFill>
+          <p:spPr>
+            <a:xfrm>
+              <a:off x="14845201" y="11058590"/>
+              <a:ext cx="5551228" cy="3810476"/>
+            </a:xfrm>
+            <a:prstGeom prst="rect">
+              <a:avLst/>
+            </a:prstGeom>
+          </p:spPr>
+        </p:pic>
+      </p:grpSp>
       <p:grpSp>
         <p:nvGrpSpPr>
           <p:cNvPr id="60" name="Group 59">
@@ -5111,10 +4927,10 @@
         </p:nvGrpSpPr>
         <p:grpSpPr>
           <a:xfrm>
-            <a:off x="14900029" y="15467556"/>
-            <a:ext cx="5490015" cy="11196469"/>
+            <a:off x="14900029" y="15159424"/>
+            <a:ext cx="5490015" cy="11405593"/>
             <a:chOff x="14900029" y="15010356"/>
-            <a:chExt cx="5490015" cy="11196469"/>
+            <a:chExt cx="5490015" cy="11405593"/>
           </a:xfrm>
         </p:grpSpPr>
         <p:grpSp>
@@ -5374,8 +5190,8 @@
           </p:blipFill>
           <p:spPr>
             <a:xfrm>
-              <a:off x="14900029" y="22044540"/>
-              <a:ext cx="5485395" cy="4162285"/>
+              <a:off x="14925430" y="22284658"/>
+              <a:ext cx="5444549" cy="4131291"/>
             </a:xfrm>
             <a:prstGeom prst="rect">
               <a:avLst/>
@@ -5383,42 +5199,280 @@
           </p:spPr>
         </p:pic>
       </p:grpSp>
-      <p:pic>
-        <p:nvPicPr>
-          <p:cNvPr id="66" name="Picture 65">
+      <p:grpSp>
+        <p:nvGrpSpPr>
+          <p:cNvPr id="9" name="Group 8">
             <a:extLst>
               <a:ext uri="{FF2B5EF4-FFF2-40B4-BE49-F238E27FC236}">
-                <a16:creationId xmlns:a16="http://schemas.microsoft.com/office/drawing/2014/main" id="{1D883EF1-C965-449E-80DF-ED24D5D4966C}"/>
+                <a16:creationId xmlns:a16="http://schemas.microsoft.com/office/drawing/2014/main" id="{4DCF77D2-9BAF-4C0D-8784-38F12B67EAFA}"/>
               </a:ext>
             </a:extLst>
           </p:cNvPr>
-          <p:cNvPicPr>
-            <a:picLocks noChangeAspect="1"/>
-          </p:cNvPicPr>
+          <p:cNvGrpSpPr/>
           <p:nvPr/>
-        </p:nvPicPr>
-        <p:blipFill>
-          <a:blip r:embed="rId9">
-            <a:extLst>
-              <a:ext uri="{28A0092B-C50C-407E-A947-70E740481C1C}">
-                <a14:useLocalDpi xmlns:a14="http://schemas.microsoft.com/office/drawing/2010/main" val="0"/>
-              </a:ext>
-            </a:extLst>
-          </a:blip>
-          <a:stretch>
-            <a:fillRect/>
-          </a:stretch>
-        </p:blipFill>
-        <p:spPr>
+        </p:nvGrpSpPr>
+        <p:grpSpPr>
           <a:xfrm>
-            <a:off x="1105678" y="22501659"/>
-            <a:ext cx="5485396" cy="4131674"/>
+            <a:off x="8097165" y="3426733"/>
+            <a:ext cx="5489973" cy="11554855"/>
+            <a:chOff x="1105678" y="15473800"/>
+            <a:chExt cx="5489973" cy="11554855"/>
           </a:xfrm>
-          <a:prstGeom prst="rect">
-            <a:avLst/>
-          </a:prstGeom>
-        </p:spPr>
-      </p:pic>
+        </p:grpSpPr>
+        <p:grpSp>
+          <p:nvGrpSpPr>
+            <p:cNvPr id="62" name="Group 61">
+              <a:extLst>
+                <a:ext uri="{FF2B5EF4-FFF2-40B4-BE49-F238E27FC236}">
+                  <a16:creationId xmlns:a16="http://schemas.microsoft.com/office/drawing/2014/main" id="{451C2698-8797-4AD7-BC4C-1C45E575DB09}"/>
+                </a:ext>
+              </a:extLst>
+            </p:cNvPr>
+            <p:cNvGrpSpPr/>
+            <p:nvPr/>
+          </p:nvGrpSpPr>
+          <p:grpSpPr>
+            <a:xfrm>
+              <a:off x="1105678" y="15473800"/>
+              <a:ext cx="5489973" cy="7412848"/>
+              <a:chOff x="1105677" y="15010356"/>
+              <a:chExt cx="5489973" cy="7412848"/>
+            </a:xfrm>
+          </p:grpSpPr>
+          <p:sp>
+            <p:nvSpPr>
+              <p:cNvPr id="15" name="TextBox 14">
+                <a:extLst>
+                  <a:ext uri="{FF2B5EF4-FFF2-40B4-BE49-F238E27FC236}">
+                    <a16:creationId xmlns:a16="http://schemas.microsoft.com/office/drawing/2014/main" id="{36583889-AC97-4BEC-AC3F-F44E37930580}"/>
+                  </a:ext>
+                </a:extLst>
+              </p:cNvPr>
+              <p:cNvSpPr txBox="1"/>
+              <p:nvPr/>
+            </p:nvSpPr>
+            <p:spPr>
+              <a:xfrm>
+                <a:off x="1105678" y="15732142"/>
+                <a:ext cx="5489972" cy="6691062"/>
+              </a:xfrm>
+              <a:prstGeom prst="rect">
+                <a:avLst/>
+              </a:prstGeom>
+              <a:noFill/>
+            </p:spPr>
+            <p:txBody>
+              <a:bodyPr wrap="square" rtlCol="0">
+                <a:spAutoFit/>
+              </a:bodyPr>
+              <a:lstStyle/>
+              <a:p>
+                <a:pPr marL="342900" indent="-342900">
+                  <a:lnSpc>
+                    <a:spcPct val="125000"/>
+                  </a:lnSpc>
+                  <a:buFont typeface="Arial" panose="020B0604020202020204" pitchFamily="34" charset="0"/>
+                  <a:buChar char="•"/>
+                </a:pPr>
+                <a:r>
+                  <a:rPr lang="en-GB" sz="2300" dirty="0">
+                    <a:latin typeface="Montserrat" panose="00000500000000000000" pitchFamily="2" charset="0"/>
+                  </a:rPr>
+                  <a:t>Energy measurements available through the Intel Running Average Power Limit (</a:t>
+                </a:r>
+                <a:r>
+                  <a:rPr lang="en-GB" sz="2300" b="1" dirty="0">
+                    <a:latin typeface="Montserrat" panose="00000500000000000000" pitchFamily="2" charset="0"/>
+                  </a:rPr>
+                  <a:t>RAPL</a:t>
+                </a:r>
+                <a:r>
+                  <a:rPr lang="en-GB" sz="2300" dirty="0">
+                    <a:latin typeface="Montserrat" panose="00000500000000000000" pitchFamily="2" charset="0"/>
+                  </a:rPr>
+                  <a:t>)  feature.</a:t>
+                </a:r>
+                <a:br>
+                  <a:rPr lang="en-GB" sz="2300" dirty="0">
+                    <a:latin typeface="Montserrat" panose="00000500000000000000" pitchFamily="2" charset="0"/>
+                  </a:rPr>
+                </a:br>
+                <a:endParaRPr lang="en-GB" sz="2300" dirty="0">
+                  <a:latin typeface="Montserrat" panose="00000500000000000000" pitchFamily="2" charset="0"/>
+                </a:endParaRPr>
+              </a:p>
+              <a:p>
+                <a:pPr marL="342900" indent="-342900">
+                  <a:lnSpc>
+                    <a:spcPct val="125000"/>
+                  </a:lnSpc>
+                  <a:buFont typeface="Arial" panose="020B0604020202020204" pitchFamily="34" charset="0"/>
+                  <a:buChar char="•"/>
+                </a:pPr>
+                <a:r>
+                  <a:rPr lang="en-GB" sz="2300" dirty="0">
+                    <a:latin typeface="Montserrat" panose="00000500000000000000" pitchFamily="2" charset="0"/>
+                  </a:rPr>
+                  <a:t>Measures processor package and DRAM energy consumption.</a:t>
+                </a:r>
+                <a:br>
+                  <a:rPr lang="en-GB" sz="2300" dirty="0">
+                    <a:latin typeface="Montserrat" panose="00000500000000000000" pitchFamily="2" charset="0"/>
+                  </a:rPr>
+                </a:br>
+                <a:endParaRPr lang="en-GB" sz="2300" dirty="0">
+                  <a:latin typeface="Montserrat" panose="00000500000000000000" pitchFamily="2" charset="0"/>
+                </a:endParaRPr>
+              </a:p>
+              <a:p>
+                <a:pPr marL="342900" indent="-342900">
+                  <a:lnSpc>
+                    <a:spcPct val="125000"/>
+                  </a:lnSpc>
+                  <a:buFont typeface="Arial" panose="020B0604020202020204" pitchFamily="34" charset="0"/>
+                  <a:buChar char="•"/>
+                </a:pPr>
+                <a:endParaRPr lang="en-GB" sz="2300" dirty="0">
+                  <a:latin typeface="Montserrat" panose="00000500000000000000" pitchFamily="2" charset="0"/>
+                </a:endParaRPr>
+              </a:p>
+              <a:p>
+                <a:pPr marL="342900" indent="-342900">
+                  <a:lnSpc>
+                    <a:spcPct val="125000"/>
+                  </a:lnSpc>
+                  <a:buFont typeface="Arial" panose="020B0604020202020204" pitchFamily="34" charset="0"/>
+                  <a:buChar char="•"/>
+                </a:pPr>
+                <a:r>
+                  <a:rPr lang="en-GB" sz="2300" dirty="0">
+                    <a:latin typeface="Montserrat" panose="00000500000000000000" pitchFamily="2" charset="0"/>
+                  </a:rPr>
+                  <a:t>Energy monitoring tool written in C.</a:t>
+                </a:r>
+                <a:br>
+                  <a:rPr lang="en-GB" sz="2300" dirty="0">
+                    <a:latin typeface="Montserrat" panose="00000500000000000000" pitchFamily="2" charset="0"/>
+                  </a:rPr>
+                </a:br>
+                <a:endParaRPr lang="en-GB" sz="2300" dirty="0">
+                  <a:latin typeface="Montserrat" panose="00000500000000000000" pitchFamily="2" charset="0"/>
+                </a:endParaRPr>
+              </a:p>
+              <a:p>
+                <a:pPr marL="342900" indent="-342900">
+                  <a:lnSpc>
+                    <a:spcPct val="125000"/>
+                  </a:lnSpc>
+                  <a:buFont typeface="Arial" panose="020B0604020202020204" pitchFamily="34" charset="0"/>
+                  <a:buChar char="•"/>
+                </a:pPr>
+                <a:r>
+                  <a:rPr lang="en-GB" sz="2300" dirty="0">
+                    <a:latin typeface="Montserrat" panose="00000500000000000000" pitchFamily="2" charset="0"/>
+                  </a:rPr>
+                  <a:t>Multiple versions of monitoring tool developed and tested for </a:t>
+                </a:r>
+                <a:r>
+                  <a:rPr lang="en-GB" sz="2300" b="1" dirty="0">
+                    <a:latin typeface="Montserrat" panose="00000500000000000000" pitchFamily="2" charset="0"/>
+                  </a:rPr>
+                  <a:t>stability</a:t>
+                </a:r>
+                <a:r>
+                  <a:rPr lang="en-GB" sz="2300" dirty="0">
+                    <a:latin typeface="Montserrat" panose="00000500000000000000" pitchFamily="2" charset="0"/>
+                  </a:rPr>
+                  <a:t>:</a:t>
+                </a:r>
+              </a:p>
+            </p:txBody>
+          </p:sp>
+          <p:sp>
+            <p:nvSpPr>
+              <p:cNvPr id="51" name="TextBox 50">
+                <a:extLst>
+                  <a:ext uri="{FF2B5EF4-FFF2-40B4-BE49-F238E27FC236}">
+                    <a16:creationId xmlns:a16="http://schemas.microsoft.com/office/drawing/2014/main" id="{EFAD6EDA-81D5-42A1-B56C-0ED7E7C7735A}"/>
+                  </a:ext>
+                </a:extLst>
+              </p:cNvPr>
+              <p:cNvSpPr txBox="1"/>
+              <p:nvPr/>
+            </p:nvSpPr>
+            <p:spPr>
+              <a:xfrm>
+                <a:off x="1105677" y="15010356"/>
+                <a:ext cx="5485396" cy="625684"/>
+              </a:xfrm>
+              <a:prstGeom prst="rect">
+                <a:avLst/>
+              </a:prstGeom>
+              <a:solidFill>
+                <a:srgbClr val="235078"/>
+              </a:solidFill>
+            </p:spPr>
+            <p:txBody>
+              <a:bodyPr wrap="square" rtlCol="0">
+                <a:spAutoFit/>
+              </a:bodyPr>
+              <a:lstStyle/>
+              <a:p>
+                <a:pPr>
+                  <a:lnSpc>
+                    <a:spcPct val="125000"/>
+                  </a:lnSpc>
+                </a:pPr>
+                <a:r>
+                  <a:rPr lang="en-GB" sz="3000" b="1" dirty="0">
+                    <a:solidFill>
+                      <a:schemeClr val="bg1"/>
+                    </a:solidFill>
+                    <a:latin typeface="Libre Baskerville" panose="02000000000000000000" pitchFamily="2" charset="0"/>
+                  </a:rPr>
+                  <a:t>Energy Measurements</a:t>
+                </a:r>
+              </a:p>
+            </p:txBody>
+          </p:sp>
+        </p:grpSp>
+        <p:pic>
+          <p:nvPicPr>
+            <p:cNvPr id="66" name="Picture 65">
+              <a:extLst>
+                <a:ext uri="{FF2B5EF4-FFF2-40B4-BE49-F238E27FC236}">
+                  <a16:creationId xmlns:a16="http://schemas.microsoft.com/office/drawing/2014/main" id="{1D883EF1-C965-449E-80DF-ED24D5D4966C}"/>
+                </a:ext>
+              </a:extLst>
+            </p:cNvPr>
+            <p:cNvPicPr>
+              <a:picLocks noChangeAspect="1"/>
+            </p:cNvPicPr>
+            <p:nvPr/>
+          </p:nvPicPr>
+          <p:blipFill>
+            <a:blip r:embed="rId9">
+              <a:extLst>
+                <a:ext uri="{28A0092B-C50C-407E-A947-70E740481C1C}">
+                  <a14:useLocalDpi xmlns:a14="http://schemas.microsoft.com/office/drawing/2010/main" val="0"/>
+                </a:ext>
+              </a:extLst>
+            </a:blip>
+            <a:stretch>
+              <a:fillRect/>
+            </a:stretch>
+          </p:blipFill>
+          <p:spPr>
+            <a:xfrm>
+              <a:off x="1259252" y="23053207"/>
+              <a:ext cx="5277984" cy="3975448"/>
+            </a:xfrm>
+            <a:prstGeom prst="rect">
+              <a:avLst/>
+            </a:prstGeom>
+          </p:spPr>
+        </p:pic>
+      </p:grpSp>
     </p:spTree>
     <p:extLst>
       <p:ext uri="{BB962C8B-B14F-4D97-AF65-F5344CB8AC3E}">

</xml_diff>